<commit_message>
Wahhhhh more updates. I swear I'm going to sleep now..
</commit_message>
<xml_diff>
--- a/docs/mock-ups/Mock-ups.pptx
+++ b/docs/mock-ups/Mock-ups.pptx
@@ -5243,8 +5243,8 @@
         </p:nvSpPr>
         <p:spPr>
           <a:xfrm>
-            <a:off x="5105401" y="-19237"/>
-            <a:ext cx="3412672" cy="6267637"/>
+            <a:off x="5105401" y="76200"/>
+            <a:ext cx="3412672" cy="6172200"/>
           </a:xfrm>
           <a:prstGeom prst="rect">
             <a:avLst/>
@@ -5678,8 +5678,8 @@
         </p:nvSpPr>
         <p:spPr>
           <a:xfrm>
-            <a:off x="5105400" y="0"/>
-            <a:ext cx="3397431" cy="1905000"/>
+            <a:off x="5105400" y="76200"/>
+            <a:ext cx="3397431" cy="1828800"/>
           </a:xfrm>
           <a:prstGeom prst="rect">
             <a:avLst/>
@@ -6443,6 +6443,42 @@
           </a:p>
         </p:txBody>
       </p:sp>
+      <p:cxnSp>
+        <p:nvCxnSpPr>
+          <p:cNvPr id="57" name="Straight Arrow Connector 56"/>
+          <p:cNvCxnSpPr/>
+          <p:nvPr/>
+        </p:nvCxnSpPr>
+        <p:spPr>
+          <a:xfrm>
+            <a:off x="152400" y="3048000"/>
+            <a:ext cx="304800" cy="0"/>
+          </a:xfrm>
+          <a:prstGeom prst="straightConnector1">
+            <a:avLst/>
+          </a:prstGeom>
+          <a:ln w="28575">
+            <a:solidFill>
+              <a:srgbClr val="FF0000"/>
+            </a:solidFill>
+            <a:tailEnd type="arrow"/>
+          </a:ln>
+        </p:spPr>
+        <p:style>
+          <a:lnRef idx="1">
+            <a:schemeClr val="accent1"/>
+          </a:lnRef>
+          <a:fillRef idx="0">
+            <a:schemeClr val="accent1"/>
+          </a:fillRef>
+          <a:effectRef idx="0">
+            <a:schemeClr val="accent1"/>
+          </a:effectRef>
+          <a:fontRef idx="minor">
+            <a:schemeClr val="tx1"/>
+          </a:fontRef>
+        </p:style>
+      </p:cxnSp>
     </p:spTree>
     <p:extLst>
       <p:ext uri="{BB962C8B-B14F-4D97-AF65-F5344CB8AC3E}">
@@ -13518,6 +13554,42 @@
           </a:prstGeom>
         </p:spPr>
       </p:pic>
+      <p:cxnSp>
+        <p:nvCxnSpPr>
+          <p:cNvPr id="41" name="Straight Arrow Connector 40"/>
+          <p:cNvCxnSpPr/>
+          <p:nvPr/>
+        </p:nvCxnSpPr>
+        <p:spPr>
+          <a:xfrm>
+            <a:off x="8610600" y="3048000"/>
+            <a:ext cx="381000" cy="0"/>
+          </a:xfrm>
+          <a:prstGeom prst="straightConnector1">
+            <a:avLst/>
+          </a:prstGeom>
+          <a:ln w="28575">
+            <a:solidFill>
+              <a:srgbClr val="FF0000"/>
+            </a:solidFill>
+            <a:tailEnd type="arrow"/>
+          </a:ln>
+        </p:spPr>
+        <p:style>
+          <a:lnRef idx="1">
+            <a:schemeClr val="accent1"/>
+          </a:lnRef>
+          <a:fillRef idx="0">
+            <a:schemeClr val="accent1"/>
+          </a:fillRef>
+          <a:effectRef idx="0">
+            <a:schemeClr val="accent1"/>
+          </a:effectRef>
+          <a:fontRef idx="minor">
+            <a:schemeClr val="tx1"/>
+          </a:fontRef>
+        </p:style>
+      </p:cxnSp>
     </p:spTree>
     <p:extLst>
       <p:ext uri="{BB962C8B-B14F-4D97-AF65-F5344CB8AC3E}">
@@ -13556,7 +13628,7 @@
         </p:nvSpPr>
         <p:spPr>
           <a:xfrm>
-            <a:off x="457200" y="304800"/>
+            <a:off x="533400" y="304800"/>
             <a:ext cx="3397431" cy="5562600"/>
           </a:xfrm>
           <a:prstGeom prst="rect">
@@ -13616,7 +13688,7 @@
         </p:nvSpPr>
         <p:spPr>
           <a:xfrm>
-            <a:off x="1219200" y="2404714"/>
+            <a:off x="1295400" y="2404714"/>
             <a:ext cx="1905000" cy="1100486"/>
           </a:xfrm>
           <a:prstGeom prst="roundRect">
@@ -13667,7 +13739,7 @@
         </p:nvSpPr>
         <p:spPr>
           <a:xfrm>
-            <a:off x="3200400" y="3657600"/>
+            <a:off x="3276600" y="3657600"/>
             <a:ext cx="304800" cy="304800"/>
           </a:xfrm>
           <a:prstGeom prst="mathPlus">
@@ -13715,7 +13787,7 @@
         </p:nvSpPr>
         <p:spPr>
           <a:xfrm>
-            <a:off x="1219200" y="3623914"/>
+            <a:off x="1295400" y="3623914"/>
             <a:ext cx="1905000" cy="381000"/>
           </a:xfrm>
           <a:prstGeom prst="roundRect">
@@ -13766,7 +13838,7 @@
         </p:nvSpPr>
         <p:spPr>
           <a:xfrm>
-            <a:off x="1219200" y="3657600"/>
+            <a:off x="1295400" y="3657600"/>
             <a:ext cx="1828800" cy="338554"/>
           </a:xfrm>
           <a:prstGeom prst="rect">
@@ -13796,7 +13868,7 @@
         </p:nvSpPr>
         <p:spPr>
           <a:xfrm>
-            <a:off x="457200" y="457200"/>
+            <a:off x="533400" y="457200"/>
             <a:ext cx="3352800" cy="2154436"/>
           </a:xfrm>
           <a:prstGeom prst="rect">
@@ -13850,7 +13922,7 @@
         </p:nvSpPr>
         <p:spPr>
           <a:xfrm>
-            <a:off x="3200400" y="2819400"/>
+            <a:off x="3276600" y="2819400"/>
             <a:ext cx="304800" cy="228600"/>
           </a:xfrm>
           <a:prstGeom prst="mathMinus">
@@ -13897,7 +13969,7 @@
         </p:nvSpPr>
         <p:spPr>
           <a:xfrm>
-            <a:off x="457200" y="5867400"/>
+            <a:off x="533400" y="5867400"/>
             <a:ext cx="3352800" cy="369332"/>
           </a:xfrm>
           <a:prstGeom prst="rect">
@@ -13936,7 +14008,7 @@
         </p:nvSpPr>
         <p:spPr>
           <a:xfrm>
-            <a:off x="1295400" y="2438400"/>
+            <a:off x="1371600" y="2438400"/>
             <a:ext cx="1752600" cy="304800"/>
           </a:xfrm>
           <a:prstGeom prst="rect">
@@ -13981,7 +14053,7 @@
         </p:nvSpPr>
         <p:spPr>
           <a:xfrm>
-            <a:off x="1295400" y="3200400"/>
+            <a:off x="1371600" y="3200400"/>
             <a:ext cx="1752600" cy="228600"/>
           </a:xfrm>
           <a:prstGeom prst="rect">
@@ -14026,7 +14098,7 @@
         </p:nvSpPr>
         <p:spPr>
           <a:xfrm>
-            <a:off x="1219200" y="2438400"/>
+            <a:off x="1295400" y="2438400"/>
             <a:ext cx="1828800" cy="1323439"/>
           </a:xfrm>
           <a:prstGeom prst="rect">
@@ -14076,7 +14148,7 @@
         </p:nvSpPr>
         <p:spPr>
           <a:xfrm>
-            <a:off x="3124200" y="2667000"/>
+            <a:off x="3200400" y="2667000"/>
             <a:ext cx="457200" cy="533400"/>
           </a:xfrm>
           <a:prstGeom prst="rect">
@@ -14679,7 +14751,7 @@
         </p:nvSpPr>
         <p:spPr>
           <a:xfrm>
-            <a:off x="1219200" y="4114800"/>
+            <a:off x="1295400" y="4114800"/>
             <a:ext cx="928278" cy="369332"/>
           </a:xfrm>
           <a:prstGeom prst="rect">
@@ -14729,7 +14801,7 @@
         </p:nvSpPr>
         <p:spPr>
           <a:xfrm>
-            <a:off x="2286000" y="4114800"/>
+            <a:off x="2362200" y="4114800"/>
             <a:ext cx="928278" cy="369332"/>
           </a:xfrm>
           <a:prstGeom prst="rect">
@@ -14815,7 +14887,7 @@
         </p:nvSpPr>
         <p:spPr>
           <a:xfrm>
-            <a:off x="457199" y="5257800"/>
+            <a:off x="533399" y="5257800"/>
             <a:ext cx="3397431" cy="609600"/>
           </a:xfrm>
           <a:prstGeom prst="rect">
@@ -14855,7 +14927,7 @@
         </p:nvSpPr>
         <p:spPr>
           <a:xfrm>
-            <a:off x="457200" y="5257800"/>
+            <a:off x="533400" y="5257800"/>
             <a:ext cx="3397431" cy="609600"/>
           </a:xfrm>
           <a:prstGeom prst="rect">
@@ -14909,7 +14981,7 @@
         </p:blipFill>
         <p:spPr>
           <a:xfrm>
-            <a:off x="1143000" y="5410200"/>
+            <a:off x="1219200" y="5410200"/>
             <a:ext cx="304800" cy="304800"/>
           </a:xfrm>
           <a:prstGeom prst="rect">
@@ -14939,7 +15011,7 @@
         </p:blipFill>
         <p:spPr>
           <a:xfrm>
-            <a:off x="3352800" y="5410200"/>
+            <a:off x="3429000" y="5410200"/>
             <a:ext cx="304800" cy="304800"/>
           </a:xfrm>
           <a:prstGeom prst="rect">
@@ -14955,7 +15027,7 @@
         </p:nvSpPr>
         <p:spPr>
           <a:xfrm>
-            <a:off x="1754777" y="5286103"/>
+            <a:off x="1830977" y="5286103"/>
             <a:ext cx="685800" cy="533400"/>
           </a:xfrm>
           <a:prstGeom prst="roundRect">
@@ -15016,7 +15088,7 @@
         </p:blipFill>
         <p:spPr>
           <a:xfrm>
-            <a:off x="533400" y="5410200"/>
+            <a:off x="609600" y="5410200"/>
             <a:ext cx="304800" cy="304800"/>
           </a:xfrm>
           <a:prstGeom prst="rect">
@@ -15046,7 +15118,7 @@
         </p:blipFill>
         <p:spPr>
           <a:xfrm>
-            <a:off x="2743200" y="5410200"/>
+            <a:off x="2819400" y="5410200"/>
             <a:ext cx="304800" cy="304800"/>
           </a:xfrm>
           <a:prstGeom prst="rect">
@@ -15301,6 +15373,42 @@
           </a:prstGeom>
         </p:spPr>
       </p:pic>
+      <p:cxnSp>
+        <p:nvCxnSpPr>
+          <p:cNvPr id="47" name="Straight Arrow Connector 46"/>
+          <p:cNvCxnSpPr/>
+          <p:nvPr/>
+        </p:nvCxnSpPr>
+        <p:spPr>
+          <a:xfrm>
+            <a:off x="152400" y="3048000"/>
+            <a:ext cx="304800" cy="0"/>
+          </a:xfrm>
+          <a:prstGeom prst="straightConnector1">
+            <a:avLst/>
+          </a:prstGeom>
+          <a:ln w="28575">
+            <a:solidFill>
+              <a:srgbClr val="FF0000"/>
+            </a:solidFill>
+            <a:tailEnd type="arrow"/>
+          </a:ln>
+        </p:spPr>
+        <p:style>
+          <a:lnRef idx="1">
+            <a:schemeClr val="accent1"/>
+          </a:lnRef>
+          <a:fillRef idx="0">
+            <a:schemeClr val="accent1"/>
+          </a:fillRef>
+          <a:effectRef idx="0">
+            <a:schemeClr val="accent1"/>
+          </a:effectRef>
+          <a:fontRef idx="minor">
+            <a:schemeClr val="tx1"/>
+          </a:fontRef>
+        </p:style>
+      </p:cxnSp>
     </p:spTree>
     <p:extLst>
       <p:ext uri="{BB962C8B-B14F-4D97-AF65-F5344CB8AC3E}">
@@ -29741,8 +29849,8 @@
         </p:nvSpPr>
         <p:spPr>
           <a:xfrm>
-            <a:off x="5105401" y="-19237"/>
-            <a:ext cx="3412672" cy="6267637"/>
+            <a:off x="5105401" y="76200"/>
+            <a:ext cx="3412672" cy="6172200"/>
           </a:xfrm>
           <a:prstGeom prst="rect">
             <a:avLst/>
@@ -30558,8 +30666,8 @@
         </p:nvSpPr>
         <p:spPr>
           <a:xfrm>
-            <a:off x="5105400" y="0"/>
-            <a:ext cx="3397431" cy="1905000"/>
+            <a:off x="5105400" y="76200"/>
+            <a:ext cx="3397431" cy="1828800"/>
           </a:xfrm>
           <a:prstGeom prst="rect">
             <a:avLst/>

</xml_diff>

<commit_message>
Modified Manage Block List Screen in Mock-ups
</commit_message>
<xml_diff>
--- a/docs/mock-ups/Mock-ups.pptx
+++ b/docs/mock-ups/Mock-ups.pptx
@@ -10551,7 +10551,7 @@
         </p:nvSpPr>
         <p:spPr>
           <a:xfrm>
-            <a:off x="5715000" y="2557114"/>
+            <a:off x="5562600" y="2590800"/>
             <a:ext cx="1905000" cy="1024286"/>
           </a:xfrm>
           <a:prstGeom prst="roundRect">
@@ -10602,7 +10602,7 @@
         </p:nvSpPr>
         <p:spPr>
           <a:xfrm>
-            <a:off x="5715000" y="2590800"/>
+            <a:off x="5562600" y="2590800"/>
             <a:ext cx="1828800" cy="1077218"/>
           </a:xfrm>
           <a:prstGeom prst="rect">
@@ -10646,8 +10646,8 @@
         </p:nvSpPr>
         <p:spPr>
           <a:xfrm>
-            <a:off x="7696200" y="3733800"/>
-            <a:ext cx="304800" cy="304800"/>
+            <a:off x="7543800" y="4114800"/>
+            <a:ext cx="381000" cy="381000"/>
           </a:xfrm>
           <a:prstGeom prst="mathPlus">
             <a:avLst/>
@@ -10694,7 +10694,7 @@
         </p:nvSpPr>
         <p:spPr>
           <a:xfrm>
-            <a:off x="5715000" y="3700114"/>
+            <a:off x="5562600" y="4114800"/>
             <a:ext cx="1905000" cy="381000"/>
           </a:xfrm>
           <a:prstGeom prst="roundRect">
@@ -10739,86 +10739,6 @@
       </p:sp>
       <p:sp>
         <p:nvSpPr>
-          <p:cNvPr id="100" name="TextBox 99"/>
-          <p:cNvSpPr txBox="1"/>
-          <p:nvPr/>
-        </p:nvSpPr>
-        <p:spPr>
-          <a:xfrm>
-            <a:off x="5715000" y="3733800"/>
-            <a:ext cx="1828800" cy="338554"/>
-          </a:xfrm>
-          <a:prstGeom prst="rect">
-            <a:avLst/>
-          </a:prstGeom>
-          <a:noFill/>
-        </p:spPr>
-        <p:txBody>
-          <a:bodyPr wrap="square" rtlCol="0">
-            <a:spAutoFit/>
-          </a:bodyPr>
-          <a:lstStyle/>
-          <a:p>
-            <a:r>
-              <a:rPr lang="en-US" sz="1600" dirty="0" smtClean="0"/>
-              <a:t>Username to Block</a:t>
-            </a:r>
-            <a:endParaRPr lang="en-US" sz="1600" dirty="0"/>
-          </a:p>
-        </p:txBody>
-      </p:sp>
-      <p:sp>
-        <p:nvSpPr>
-          <p:cNvPr id="102" name="TextBox 101"/>
-          <p:cNvSpPr txBox="1"/>
-          <p:nvPr/>
-        </p:nvSpPr>
-        <p:spPr>
-          <a:xfrm>
-            <a:off x="5715000" y="4267200"/>
-            <a:ext cx="928278" cy="369332"/>
-          </a:xfrm>
-          <a:prstGeom prst="rect">
-            <a:avLst/>
-          </a:prstGeom>
-          <a:solidFill>
-            <a:schemeClr val="accent1">
-              <a:lumMod val="75000"/>
-            </a:schemeClr>
-          </a:solidFill>
-          <a:ln>
-            <a:solidFill>
-              <a:schemeClr val="accent1">
-                <a:lumMod val="75000"/>
-              </a:schemeClr>
-            </a:solidFill>
-          </a:ln>
-        </p:spPr>
-        <p:txBody>
-          <a:bodyPr wrap="square" rtlCol="0">
-            <a:spAutoFit/>
-          </a:bodyPr>
-          <a:lstStyle/>
-          <a:p>
-            <a:pPr algn="ctr"/>
-            <a:r>
-              <a:rPr lang="en-US" dirty="0" smtClean="0">
-                <a:solidFill>
-                  <a:srgbClr val="FFFFFF"/>
-                </a:solidFill>
-              </a:rPr>
-              <a:t>Save</a:t>
-            </a:r>
-            <a:endParaRPr lang="en-US" dirty="0">
-              <a:solidFill>
-                <a:srgbClr val="FFFFFF"/>
-              </a:solidFill>
-            </a:endParaRPr>
-          </a:p>
-        </p:txBody>
-      </p:sp>
-      <p:sp>
-        <p:nvSpPr>
           <p:cNvPr id="104" name="TextBox 103"/>
           <p:cNvSpPr txBox="1"/>
           <p:nvPr/>
@@ -10826,7 +10746,7 @@
         <p:spPr>
           <a:xfrm>
             <a:off x="4953000" y="533400"/>
-            <a:ext cx="3352800" cy="2154436"/>
+            <a:ext cx="3352800" cy="1908215"/>
           </a:xfrm>
           <a:prstGeom prst="rect">
             <a:avLst/>
@@ -10849,20 +10769,14 @@
           </a:p>
           <a:p>
             <a:r>
-              <a:rPr lang="en-US" sz="1600" dirty="0" smtClean="0"/>
-              <a:t>-To add user to block list, type username into textbox and click the +</a:t>
-            </a:r>
-          </a:p>
-          <a:p>
-            <a:r>
-              <a:rPr lang="en-US" sz="1600" dirty="0" smtClean="0"/>
-              <a:t>-To remove user(s) from block list, click username(s) so username is highlighted, then click the –</a:t>
-            </a:r>
-          </a:p>
-          <a:p>
-            <a:r>
-              <a:rPr lang="en-US" sz="1600" dirty="0" smtClean="0"/>
-              <a:t>-When finished, click Save button</a:t>
+              <a:rPr lang="en-US" sz="1600" dirty="0"/>
+              <a:t>-To add user to block list, type username into textbox then click the +</a:t>
+            </a:r>
+          </a:p>
+          <a:p>
+            <a:r>
+              <a:rPr lang="en-US" sz="1600" dirty="0"/>
+              <a:t>-To remove user(s) from block list, select username(s) from blocked list then click the –</a:t>
             </a:r>
           </a:p>
           <a:p>
@@ -10878,8 +10792,8 @@
         </p:nvSpPr>
         <p:spPr>
           <a:xfrm>
-            <a:off x="7696200" y="2971800"/>
-            <a:ext cx="304800" cy="228600"/>
+            <a:off x="7543800" y="2895600"/>
+            <a:ext cx="381000" cy="381000"/>
           </a:xfrm>
           <a:prstGeom prst="mathMinus">
             <a:avLst/>
@@ -12136,6 +12050,98 @@
           </a:prstGeom>
         </p:spPr>
       </p:pic>
+      <p:sp>
+        <p:nvSpPr>
+          <p:cNvPr id="45" name="TextBox 44"/>
+          <p:cNvSpPr txBox="1"/>
+          <p:nvPr/>
+        </p:nvSpPr>
+        <p:spPr>
+          <a:xfrm>
+            <a:off x="5562600" y="3733800"/>
+            <a:ext cx="2667000" cy="369332"/>
+          </a:xfrm>
+          <a:prstGeom prst="rect">
+            <a:avLst/>
+          </a:prstGeom>
+          <a:noFill/>
+        </p:spPr>
+        <p:txBody>
+          <a:bodyPr wrap="square" rtlCol="0">
+            <a:spAutoFit/>
+          </a:bodyPr>
+          <a:lstStyle/>
+          <a:p>
+            <a:r>
+              <a:rPr lang="en-US" dirty="0" smtClean="0">
+                <a:solidFill>
+                  <a:schemeClr val="tx2">
+                    <a:lumMod val="75000"/>
+                  </a:schemeClr>
+                </a:solidFill>
+                <a:latin typeface="Bradley Hand Bold"/>
+                <a:cs typeface="Bradley Hand Bold"/>
+              </a:rPr>
+              <a:t>Add user to Blocked List</a:t>
+            </a:r>
+            <a:endParaRPr lang="en-US" dirty="0">
+              <a:solidFill>
+                <a:schemeClr val="tx2">
+                  <a:lumMod val="75000"/>
+                </a:schemeClr>
+              </a:solidFill>
+              <a:latin typeface="Bradley Hand Bold"/>
+              <a:cs typeface="Bradley Hand Bold"/>
+            </a:endParaRPr>
+          </a:p>
+        </p:txBody>
+      </p:sp>
+      <p:sp>
+        <p:nvSpPr>
+          <p:cNvPr id="46" name="TextBox 45"/>
+          <p:cNvSpPr txBox="1"/>
+          <p:nvPr/>
+        </p:nvSpPr>
+        <p:spPr>
+          <a:xfrm>
+            <a:off x="5486400" y="2209800"/>
+            <a:ext cx="1981200" cy="369332"/>
+          </a:xfrm>
+          <a:prstGeom prst="rect">
+            <a:avLst/>
+          </a:prstGeom>
+          <a:noFill/>
+        </p:spPr>
+        <p:txBody>
+          <a:bodyPr wrap="square" rtlCol="0">
+            <a:spAutoFit/>
+          </a:bodyPr>
+          <a:lstStyle/>
+          <a:p>
+            <a:r>
+              <a:rPr lang="en-US" dirty="0" smtClean="0">
+                <a:solidFill>
+                  <a:schemeClr val="tx2">
+                    <a:lumMod val="75000"/>
+                  </a:schemeClr>
+                </a:solidFill>
+                <a:latin typeface="Bradley Hand Bold"/>
+                <a:cs typeface="Bradley Hand Bold"/>
+              </a:rPr>
+              <a:t>Blocked List</a:t>
+            </a:r>
+            <a:endParaRPr lang="en-US" dirty="0">
+              <a:solidFill>
+                <a:schemeClr val="tx2">
+                  <a:lumMod val="75000"/>
+                </a:schemeClr>
+              </a:solidFill>
+              <a:latin typeface="Bradley Hand Bold"/>
+              <a:cs typeface="Bradley Hand Bold"/>
+            </a:endParaRPr>
+          </a:p>
+        </p:txBody>
+      </p:sp>
     </p:spTree>
     <p:extLst>
       <p:ext uri="{BB962C8B-B14F-4D97-AF65-F5344CB8AC3E}">
@@ -12174,7 +12180,7 @@
         </p:nvSpPr>
         <p:spPr>
           <a:xfrm>
-            <a:off x="381000" y="5867400"/>
+            <a:off x="533400" y="5867400"/>
             <a:ext cx="3352800" cy="369332"/>
           </a:xfrm>
           <a:prstGeom prst="rect">
@@ -12207,13 +12213,13 @@
       </p:sp>
       <p:sp>
         <p:nvSpPr>
-          <p:cNvPr id="47" name="Rectangle 46"/>
+          <p:cNvPr id="60" name="Rectangle 59"/>
           <p:cNvSpPr/>
           <p:nvPr/>
         </p:nvSpPr>
         <p:spPr>
           <a:xfrm>
-            <a:off x="4953000" y="304800"/>
+            <a:off x="609600" y="304800"/>
             <a:ext cx="3397431" cy="5562600"/>
           </a:xfrm>
           <a:prstGeom prst="rect">
@@ -12260,16 +12266,335 @@
           </a:p>
         </p:txBody>
       </p:sp>
-      <p:sp>
-        <p:nvSpPr>
-          <p:cNvPr id="95" name="Rounded Rectangle 94"/>
+      <p:cxnSp>
+        <p:nvCxnSpPr>
+          <p:cNvPr id="120" name="Straight Arrow Connector 119"/>
+          <p:cNvCxnSpPr/>
+          <p:nvPr/>
+        </p:nvCxnSpPr>
+        <p:spPr>
+          <a:xfrm>
+            <a:off x="4114800" y="3048000"/>
+            <a:ext cx="739685" cy="0"/>
+          </a:xfrm>
+          <a:prstGeom prst="straightConnector1">
+            <a:avLst/>
+          </a:prstGeom>
+          <a:ln w="28575">
+            <a:solidFill>
+              <a:srgbClr val="FF0000"/>
+            </a:solidFill>
+            <a:tailEnd type="arrow"/>
+          </a:ln>
+        </p:spPr>
+        <p:style>
+          <a:lnRef idx="1">
+            <a:schemeClr val="accent1"/>
+          </a:lnRef>
+          <a:fillRef idx="0">
+            <a:schemeClr val="accent1"/>
+          </a:fillRef>
+          <a:effectRef idx="0">
+            <a:schemeClr val="accent1"/>
+          </a:effectRef>
+          <a:fontRef idx="minor">
+            <a:schemeClr val="tx1"/>
+          </a:fontRef>
+        </p:style>
+      </p:cxnSp>
+      <p:sp>
+        <p:nvSpPr>
+          <p:cNvPr id="121" name="Rectangle 120"/>
           <p:cNvSpPr/>
           <p:nvPr/>
         </p:nvSpPr>
         <p:spPr>
           <a:xfrm>
-            <a:off x="5715000" y="2328514"/>
-            <a:ext cx="1905000" cy="1100486"/>
+            <a:off x="609599" y="5257800"/>
+            <a:ext cx="3397431" cy="609600"/>
+          </a:xfrm>
+          <a:prstGeom prst="rect">
+            <a:avLst/>
+          </a:prstGeom>
+        </p:spPr>
+        <p:style>
+          <a:lnRef idx="2">
+            <a:schemeClr val="accent1">
+              <a:shade val="50000"/>
+            </a:schemeClr>
+          </a:lnRef>
+          <a:fillRef idx="1">
+            <a:schemeClr val="accent1"/>
+          </a:fillRef>
+          <a:effectRef idx="0">
+            <a:schemeClr val="accent1"/>
+          </a:effectRef>
+          <a:fontRef idx="minor">
+            <a:schemeClr val="lt1"/>
+          </a:fontRef>
+        </p:style>
+        <p:txBody>
+          <a:bodyPr rtlCol="0" anchor="ctr"/>
+          <a:lstStyle/>
+          <a:p>
+            <a:pPr algn="ctr"/>
+            <a:endParaRPr lang="en-US"/>
+          </a:p>
+        </p:txBody>
+      </p:sp>
+      <p:sp>
+        <p:nvSpPr>
+          <p:cNvPr id="122" name="Rectangle 121"/>
+          <p:cNvSpPr/>
+          <p:nvPr/>
+        </p:nvSpPr>
+        <p:spPr>
+          <a:xfrm>
+            <a:off x="609600" y="5257800"/>
+            <a:ext cx="3397431" cy="609600"/>
+          </a:xfrm>
+          <a:prstGeom prst="rect">
+            <a:avLst/>
+          </a:prstGeom>
+        </p:spPr>
+        <p:style>
+          <a:lnRef idx="2">
+            <a:schemeClr val="accent1">
+              <a:shade val="50000"/>
+            </a:schemeClr>
+          </a:lnRef>
+          <a:fillRef idx="1">
+            <a:schemeClr val="accent1"/>
+          </a:fillRef>
+          <a:effectRef idx="0">
+            <a:schemeClr val="accent1"/>
+          </a:effectRef>
+          <a:fontRef idx="minor">
+            <a:schemeClr val="lt1"/>
+          </a:fontRef>
+        </p:style>
+        <p:txBody>
+          <a:bodyPr rtlCol="0" anchor="ctr"/>
+          <a:lstStyle/>
+          <a:p>
+            <a:pPr algn="ctr"/>
+            <a:endParaRPr lang="en-US"/>
+          </a:p>
+        </p:txBody>
+      </p:sp>
+      <p:pic>
+        <p:nvPicPr>
+          <p:cNvPr id="123" name="Picture 122" descr="chat-4-24.png"/>
+          <p:cNvPicPr>
+            <a:picLocks noChangeAspect="1"/>
+          </p:cNvPicPr>
+          <p:nvPr/>
+        </p:nvPicPr>
+        <p:blipFill>
+          <a:blip r:embed="rId2">
+            <a:extLst>
+              <a:ext uri="{28A0092B-C50C-407E-A947-70E740481C1C}">
+                <a14:useLocalDpi xmlns:a14="http://schemas.microsoft.com/office/drawing/2010/main" val="0"/>
+              </a:ext>
+            </a:extLst>
+          </a:blip>
+          <a:stretch>
+            <a:fillRect/>
+          </a:stretch>
+        </p:blipFill>
+        <p:spPr>
+          <a:xfrm>
+            <a:off x="1295400" y="5410200"/>
+            <a:ext cx="304800" cy="304800"/>
+          </a:xfrm>
+          <a:prstGeom prst="rect">
+            <a:avLst/>
+          </a:prstGeom>
+        </p:spPr>
+      </p:pic>
+      <p:pic>
+        <p:nvPicPr>
+          <p:cNvPr id="124" name="Picture 123" descr="student-24.png"/>
+          <p:cNvPicPr>
+            <a:picLocks noChangeAspect="1"/>
+          </p:cNvPicPr>
+          <p:nvPr/>
+        </p:nvPicPr>
+        <p:blipFill>
+          <a:blip r:embed="rId3">
+            <a:extLst>
+              <a:ext uri="{28A0092B-C50C-407E-A947-70E740481C1C}">
+                <a14:useLocalDpi xmlns:a14="http://schemas.microsoft.com/office/drawing/2010/main" val="0"/>
+              </a:ext>
+            </a:extLst>
+          </a:blip>
+          <a:stretch>
+            <a:fillRect/>
+          </a:stretch>
+        </p:blipFill>
+        <p:spPr>
+          <a:xfrm>
+            <a:off x="3505200" y="5410200"/>
+            <a:ext cx="304800" cy="304800"/>
+          </a:xfrm>
+          <a:prstGeom prst="rect">
+            <a:avLst/>
+          </a:prstGeom>
+        </p:spPr>
+      </p:pic>
+      <p:sp>
+        <p:nvSpPr>
+          <p:cNvPr id="125" name="Rounded Rectangle 124"/>
+          <p:cNvSpPr/>
+          <p:nvPr/>
+        </p:nvSpPr>
+        <p:spPr>
+          <a:xfrm>
+            <a:off x="1907177" y="5286103"/>
+            <a:ext cx="685800" cy="533400"/>
+          </a:xfrm>
+          <a:prstGeom prst="roundRect">
+            <a:avLst/>
+          </a:prstGeom>
+          <a:noFill/>
+          <a:ln w="76200" cmpd="sng">
+            <a:solidFill>
+              <a:schemeClr val="accent1">
+                <a:lumMod val="75000"/>
+              </a:schemeClr>
+            </a:solidFill>
+          </a:ln>
+          <a:effectLst/>
+        </p:spPr>
+        <p:style>
+          <a:lnRef idx="1">
+            <a:schemeClr val="accent1"/>
+          </a:lnRef>
+          <a:fillRef idx="3">
+            <a:schemeClr val="accent1"/>
+          </a:fillRef>
+          <a:effectRef idx="2">
+            <a:schemeClr val="accent1"/>
+          </a:effectRef>
+          <a:fontRef idx="minor">
+            <a:schemeClr val="lt1"/>
+          </a:fontRef>
+        </p:style>
+        <p:txBody>
+          <a:bodyPr rtlCol="0" anchor="ctr"/>
+          <a:lstStyle/>
+          <a:p>
+            <a:pPr algn="ctr"/>
+            <a:endParaRPr lang="en-US"/>
+          </a:p>
+        </p:txBody>
+      </p:sp>
+      <p:pic>
+        <p:nvPicPr>
+          <p:cNvPr id="126" name="Picture 125" descr="gear-2-24.png"/>
+          <p:cNvPicPr>
+            <a:picLocks noChangeAspect="1"/>
+          </p:cNvPicPr>
+          <p:nvPr/>
+        </p:nvPicPr>
+        <p:blipFill>
+          <a:blip r:embed="rId4">
+            <a:extLst>
+              <a:ext uri="{28A0092B-C50C-407E-A947-70E740481C1C}">
+                <a14:useLocalDpi xmlns:a14="http://schemas.microsoft.com/office/drawing/2010/main" val="0"/>
+              </a:ext>
+            </a:extLst>
+          </a:blip>
+          <a:stretch>
+            <a:fillRect/>
+          </a:stretch>
+        </p:blipFill>
+        <p:spPr>
+          <a:xfrm>
+            <a:off x="685800" y="5410200"/>
+            <a:ext cx="304800" cy="304800"/>
+          </a:xfrm>
+          <a:prstGeom prst="rect">
+            <a:avLst/>
+          </a:prstGeom>
+        </p:spPr>
+      </p:pic>
+      <p:pic>
+        <p:nvPicPr>
+          <p:cNvPr id="127" name="Picture 126" descr="search-13-24.png"/>
+          <p:cNvPicPr>
+            <a:picLocks noChangeAspect="1"/>
+          </p:cNvPicPr>
+          <p:nvPr/>
+        </p:nvPicPr>
+        <p:blipFill>
+          <a:blip r:embed="rId5">
+            <a:extLst>
+              <a:ext uri="{28A0092B-C50C-407E-A947-70E740481C1C}">
+                <a14:useLocalDpi xmlns:a14="http://schemas.microsoft.com/office/drawing/2010/main" val="0"/>
+              </a:ext>
+            </a:extLst>
+          </a:blip>
+          <a:stretch>
+            <a:fillRect/>
+          </a:stretch>
+        </p:blipFill>
+        <p:spPr>
+          <a:xfrm>
+            <a:off x="2895600" y="5410200"/>
+            <a:ext cx="304800" cy="304800"/>
+          </a:xfrm>
+          <a:prstGeom prst="rect">
+            <a:avLst/>
+          </a:prstGeom>
+        </p:spPr>
+      </p:pic>
+      <p:cxnSp>
+        <p:nvCxnSpPr>
+          <p:cNvPr id="41" name="Straight Arrow Connector 40"/>
+          <p:cNvCxnSpPr/>
+          <p:nvPr/>
+        </p:nvCxnSpPr>
+        <p:spPr>
+          <a:xfrm>
+            <a:off x="8610600" y="3048000"/>
+            <a:ext cx="381000" cy="0"/>
+          </a:xfrm>
+          <a:prstGeom prst="straightConnector1">
+            <a:avLst/>
+          </a:prstGeom>
+          <a:ln w="28575">
+            <a:solidFill>
+              <a:srgbClr val="FF0000"/>
+            </a:solidFill>
+            <a:tailEnd type="arrow"/>
+          </a:ln>
+        </p:spPr>
+        <p:style>
+          <a:lnRef idx="1">
+            <a:schemeClr val="accent1"/>
+          </a:lnRef>
+          <a:fillRef idx="0">
+            <a:schemeClr val="accent1"/>
+          </a:fillRef>
+          <a:effectRef idx="0">
+            <a:schemeClr val="accent1"/>
+          </a:effectRef>
+          <a:fontRef idx="minor">
+            <a:schemeClr val="tx1"/>
+          </a:fontRef>
+        </p:style>
+      </p:cxnSp>
+      <p:sp>
+        <p:nvSpPr>
+          <p:cNvPr id="43" name="Rounded Rectangle 42"/>
+          <p:cNvSpPr/>
+          <p:nvPr/>
+        </p:nvSpPr>
+        <p:spPr>
+          <a:xfrm>
+            <a:off x="1219200" y="2514600"/>
+            <a:ext cx="1905000" cy="1024286"/>
           </a:xfrm>
           <a:prstGeom prst="roundRect">
             <a:avLst/>
@@ -12313,14 +12638,14 @@
       </p:sp>
       <p:sp>
         <p:nvSpPr>
-          <p:cNvPr id="96" name="TextBox 95"/>
+          <p:cNvPr id="44" name="TextBox 43"/>
           <p:cNvSpPr txBox="1"/>
           <p:nvPr/>
         </p:nvSpPr>
         <p:spPr>
           <a:xfrm>
-            <a:off x="5715000" y="2362200"/>
-            <a:ext cx="1828800" cy="1323439"/>
+            <a:off x="1219200" y="2514600"/>
+            <a:ext cx="1828800" cy="1077218"/>
           </a:xfrm>
           <a:prstGeom prst="rect">
             <a:avLst/>
@@ -12351,26 +12676,20 @@
             </a:r>
           </a:p>
           <a:p>
-            <a:r>
-              <a:rPr lang="en-US" sz="1600" dirty="0" smtClean="0"/>
-              <a:t>BigBadChad90</a:t>
-            </a:r>
-          </a:p>
-          <a:p>
             <a:endParaRPr lang="en-US" sz="1600" dirty="0"/>
           </a:p>
         </p:txBody>
       </p:sp>
       <p:sp>
         <p:nvSpPr>
-          <p:cNvPr id="97" name="Plus 96"/>
+          <p:cNvPr id="45" name="Plus 44"/>
           <p:cNvSpPr/>
           <p:nvPr/>
         </p:nvSpPr>
         <p:spPr>
           <a:xfrm>
-            <a:off x="7696200" y="3581400"/>
-            <a:ext cx="304800" cy="304800"/>
+            <a:off x="3200400" y="4038600"/>
+            <a:ext cx="381000" cy="381000"/>
           </a:xfrm>
           <a:prstGeom prst="mathPlus">
             <a:avLst/>
@@ -12411,13 +12730,13 @@
       </p:sp>
       <p:sp>
         <p:nvSpPr>
-          <p:cNvPr id="99" name="Rounded Rectangle 98"/>
+          <p:cNvPr id="46" name="Rounded Rectangle 45"/>
           <p:cNvSpPr/>
           <p:nvPr/>
         </p:nvSpPr>
         <p:spPr>
           <a:xfrm>
-            <a:off x="5715000" y="3547714"/>
+            <a:off x="1219200" y="4038600"/>
             <a:ext cx="1905000" cy="381000"/>
           </a:xfrm>
           <a:prstGeom prst="roundRect">
@@ -12462,44 +12781,14 @@
       </p:sp>
       <p:sp>
         <p:nvSpPr>
-          <p:cNvPr id="100" name="TextBox 99"/>
+          <p:cNvPr id="48" name="TextBox 47"/>
           <p:cNvSpPr txBox="1"/>
           <p:nvPr/>
         </p:nvSpPr>
         <p:spPr>
           <a:xfrm>
-            <a:off x="5715000" y="3581400"/>
-            <a:ext cx="1828800" cy="338554"/>
-          </a:xfrm>
-          <a:prstGeom prst="rect">
-            <a:avLst/>
-          </a:prstGeom>
-          <a:noFill/>
-        </p:spPr>
-        <p:txBody>
-          <a:bodyPr wrap="square" rtlCol="0">
-            <a:spAutoFit/>
-          </a:bodyPr>
-          <a:lstStyle/>
-          <a:p>
-            <a:r>
-              <a:rPr lang="en-US" sz="1600" dirty="0" smtClean="0"/>
-              <a:t>Username to Block</a:t>
-            </a:r>
-            <a:endParaRPr lang="en-US" sz="1600" dirty="0"/>
-          </a:p>
-        </p:txBody>
-      </p:sp>
-      <p:sp>
-        <p:nvSpPr>
-          <p:cNvPr id="104" name="TextBox 103"/>
-          <p:cNvSpPr txBox="1"/>
-          <p:nvPr/>
-        </p:nvSpPr>
-        <p:spPr>
-          <a:xfrm>
-            <a:off x="4953000" y="381000"/>
-            <a:ext cx="3352800" cy="2154436"/>
+            <a:off x="609600" y="457200"/>
+            <a:ext cx="3352800" cy="1661993"/>
           </a:xfrm>
           <a:prstGeom prst="rect">
             <a:avLst/>
@@ -12522,38 +12811,29 @@
           </a:p>
           <a:p>
             <a:r>
-              <a:rPr lang="en-US" sz="1600" dirty="0" smtClean="0"/>
-              <a:t>-To add user to block list, type username into textbox and click the +</a:t>
+              <a:rPr lang="en-US" sz="1600" dirty="0"/>
+              <a:t>-To add user to block list, type username into textbox then click the +</a:t>
+            </a:r>
+          </a:p>
+          <a:p>
+            <a:r>
+              <a:rPr lang="en-US" sz="1600" dirty="0"/>
+              <a:t>-To remove user(s) from block list, select username(s) from blocked list then click the –</a:t>
             </a:r>
             <a:endParaRPr lang="en-US" sz="1600" dirty="0"/>
           </a:p>
-          <a:p>
-            <a:r>
-              <a:rPr lang="en-US" sz="1600" dirty="0" smtClean="0"/>
-              <a:t>-To remove user(s) from block list, click username(s) so username is highlighted, then click the –</a:t>
-            </a:r>
-          </a:p>
-          <a:p>
-            <a:r>
-              <a:rPr lang="en-US" sz="1600" dirty="0" smtClean="0"/>
-              <a:t>-When finished, click Save button</a:t>
-            </a:r>
-          </a:p>
-          <a:p>
-            <a:endParaRPr lang="en-US" sz="1600" dirty="0"/>
-          </a:p>
-        </p:txBody>
-      </p:sp>
-      <p:sp>
-        <p:nvSpPr>
-          <p:cNvPr id="2" name="Minus 1"/>
+        </p:txBody>
+      </p:sp>
+      <p:sp>
+        <p:nvSpPr>
+          <p:cNvPr id="49" name="Minus 48"/>
           <p:cNvSpPr/>
           <p:nvPr/>
         </p:nvSpPr>
         <p:spPr>
           <a:xfrm>
-            <a:off x="7696200" y="2743200"/>
-            <a:ext cx="304800" cy="228600"/>
+            <a:off x="3200400" y="2819400"/>
+            <a:ext cx="381000" cy="381000"/>
           </a:xfrm>
           <a:prstGeom prst="mathMinus">
             <a:avLst/>
@@ -12593,13 +12873,89 @@
       </p:sp>
       <p:sp>
         <p:nvSpPr>
-          <p:cNvPr id="60" name="Rectangle 59"/>
+          <p:cNvPr id="50" name="Rectangle 49"/>
           <p:cNvSpPr/>
           <p:nvPr/>
         </p:nvSpPr>
         <p:spPr>
           <a:xfrm>
-            <a:off x="457200" y="304800"/>
+            <a:off x="3200400" y="4038600"/>
+            <a:ext cx="381000" cy="381000"/>
+          </a:xfrm>
+          <a:prstGeom prst="rect">
+            <a:avLst/>
+          </a:prstGeom>
+          <a:noFill/>
+          <a:ln w="50800">
+            <a:solidFill>
+              <a:srgbClr val="FF0000"/>
+            </a:solidFill>
+          </a:ln>
+        </p:spPr>
+        <p:style>
+          <a:lnRef idx="2">
+            <a:schemeClr val="accent1">
+              <a:shade val="50000"/>
+            </a:schemeClr>
+          </a:lnRef>
+          <a:fillRef idx="1">
+            <a:schemeClr val="accent1"/>
+          </a:fillRef>
+          <a:effectRef idx="0">
+            <a:schemeClr val="accent1"/>
+          </a:effectRef>
+          <a:fontRef idx="minor">
+            <a:schemeClr val="lt1"/>
+          </a:fontRef>
+        </p:style>
+        <p:txBody>
+          <a:bodyPr rtlCol="0" anchor="ctr"/>
+          <a:lstStyle/>
+          <a:p>
+            <a:pPr algn="ctr"/>
+            <a:endParaRPr lang="en-US"/>
+          </a:p>
+        </p:txBody>
+      </p:sp>
+      <p:sp>
+        <p:nvSpPr>
+          <p:cNvPr id="51" name="TextBox 50"/>
+          <p:cNvSpPr txBox="1"/>
+          <p:nvPr/>
+        </p:nvSpPr>
+        <p:spPr>
+          <a:xfrm>
+            <a:off x="1219200" y="4038600"/>
+            <a:ext cx="1828800" cy="338554"/>
+          </a:xfrm>
+          <a:prstGeom prst="rect">
+            <a:avLst/>
+          </a:prstGeom>
+          <a:noFill/>
+        </p:spPr>
+        <p:txBody>
+          <a:bodyPr wrap="square" rtlCol="0">
+            <a:spAutoFit/>
+          </a:bodyPr>
+          <a:lstStyle/>
+          <a:p>
+            <a:r>
+              <a:rPr lang="en-US" sz="1600" dirty="0" smtClean="0"/>
+              <a:t>BigBadChad90</a:t>
+            </a:r>
+            <a:endParaRPr lang="en-US" sz="1600" dirty="0"/>
+          </a:p>
+        </p:txBody>
+      </p:sp>
+      <p:sp>
+        <p:nvSpPr>
+          <p:cNvPr id="52" name="Rectangle 51"/>
+          <p:cNvSpPr/>
+          <p:nvPr/>
+        </p:nvSpPr>
+        <p:spPr>
+          <a:xfrm>
+            <a:off x="4953000" y="304800"/>
             <a:ext cx="3397431" cy="5562600"/>
           </a:xfrm>
           <a:prstGeom prst="rect">
@@ -12648,13 +13004,13 @@
       </p:sp>
       <p:sp>
         <p:nvSpPr>
-          <p:cNvPr id="74" name="Rounded Rectangle 73"/>
+          <p:cNvPr id="53" name="Rounded Rectangle 52"/>
           <p:cNvSpPr/>
           <p:nvPr/>
         </p:nvSpPr>
         <p:spPr>
           <a:xfrm>
-            <a:off x="1219200" y="2328514"/>
+            <a:off x="5562600" y="2514600"/>
             <a:ext cx="1905000" cy="1024286"/>
           </a:xfrm>
           <a:prstGeom prst="roundRect">
@@ -12699,14 +13055,14 @@
       </p:sp>
       <p:sp>
         <p:nvSpPr>
-          <p:cNvPr id="75" name="TextBox 74"/>
+          <p:cNvPr id="54" name="TextBox 53"/>
           <p:cNvSpPr txBox="1"/>
           <p:nvPr/>
         </p:nvSpPr>
         <p:spPr>
           <a:xfrm>
-            <a:off x="1219200" y="2362200"/>
-            <a:ext cx="1828800" cy="1077218"/>
+            <a:off x="5562600" y="2514600"/>
+            <a:ext cx="1828800" cy="1323439"/>
           </a:xfrm>
           <a:prstGeom prst="rect">
             <a:avLst/>
@@ -12737,20 +13093,26 @@
             </a:r>
           </a:p>
           <a:p>
+            <a:r>
+              <a:rPr lang="en-US" sz="1600" dirty="0" smtClean="0"/>
+              <a:t>BigBadChad90</a:t>
+            </a:r>
+          </a:p>
+          <a:p>
             <a:endParaRPr lang="en-US" sz="1600" dirty="0"/>
           </a:p>
         </p:txBody>
       </p:sp>
       <p:sp>
         <p:nvSpPr>
-          <p:cNvPr id="94" name="Plus 93"/>
+          <p:cNvPr id="55" name="Plus 54"/>
           <p:cNvSpPr/>
           <p:nvPr/>
         </p:nvSpPr>
         <p:spPr>
           <a:xfrm>
-            <a:off x="3200400" y="3505200"/>
-            <a:ext cx="304800" cy="304800"/>
+            <a:off x="7543800" y="4038600"/>
+            <a:ext cx="381000" cy="381000"/>
           </a:xfrm>
           <a:prstGeom prst="mathPlus">
             <a:avLst/>
@@ -12791,13 +13153,13 @@
       </p:sp>
       <p:sp>
         <p:nvSpPr>
-          <p:cNvPr id="98" name="Rounded Rectangle 97"/>
+          <p:cNvPr id="56" name="Rounded Rectangle 55"/>
           <p:cNvSpPr/>
           <p:nvPr/>
         </p:nvSpPr>
         <p:spPr>
           <a:xfrm>
-            <a:off x="1219200" y="3471514"/>
+            <a:off x="5562600" y="4038600"/>
             <a:ext cx="1905000" cy="381000"/>
           </a:xfrm>
           <a:prstGeom prst="roundRect">
@@ -12842,44 +13204,14 @@
       </p:sp>
       <p:sp>
         <p:nvSpPr>
-          <p:cNvPr id="103" name="TextBox 102"/>
+          <p:cNvPr id="57" name="TextBox 56"/>
           <p:cNvSpPr txBox="1"/>
           <p:nvPr/>
         </p:nvSpPr>
         <p:spPr>
           <a:xfrm>
-            <a:off x="1219200" y="3505200"/>
-            <a:ext cx="1828800" cy="338554"/>
-          </a:xfrm>
-          <a:prstGeom prst="rect">
-            <a:avLst/>
-          </a:prstGeom>
-          <a:noFill/>
-        </p:spPr>
-        <p:txBody>
-          <a:bodyPr wrap="square" rtlCol="0">
-            <a:spAutoFit/>
-          </a:bodyPr>
-          <a:lstStyle/>
-          <a:p>
-            <a:r>
-              <a:rPr lang="en-US" sz="1600" dirty="0" smtClean="0"/>
-              <a:t>BigBadChad90</a:t>
-            </a:r>
-            <a:endParaRPr lang="en-US" sz="1600" dirty="0"/>
-          </a:p>
-        </p:txBody>
-      </p:sp>
-      <p:sp>
-        <p:nvSpPr>
-          <p:cNvPr id="106" name="TextBox 105"/>
-          <p:cNvSpPr txBox="1"/>
-          <p:nvPr/>
-        </p:nvSpPr>
-        <p:spPr>
-          <a:xfrm>
-            <a:off x="457200" y="381000"/>
-            <a:ext cx="3352800" cy="2154436"/>
+            <a:off x="4953000" y="457200"/>
+            <a:ext cx="3352800" cy="1661993"/>
           </a:xfrm>
           <a:prstGeom prst="rect">
             <a:avLst/>
@@ -12902,38 +13234,29 @@
           </a:p>
           <a:p>
             <a:r>
-              <a:rPr lang="en-US" sz="1600" dirty="0" smtClean="0"/>
-              <a:t>-To add user to block list, type username into textbox and click the +</a:t>
+              <a:rPr lang="en-US" sz="1600" dirty="0"/>
+              <a:t>-To add user to block list, type username into textbox then click the +</a:t>
+            </a:r>
+          </a:p>
+          <a:p>
+            <a:r>
+              <a:rPr lang="en-US" sz="1600" dirty="0"/>
+              <a:t>-To remove user(s) from block list, select username(s) from blocked list then click the –</a:t>
             </a:r>
             <a:endParaRPr lang="en-US" sz="1600" dirty="0"/>
           </a:p>
-          <a:p>
-            <a:r>
-              <a:rPr lang="en-US" sz="1600" dirty="0" smtClean="0"/>
-              <a:t>-To remove user(s) from block list, click username(s) so username is highlighted, then click the –</a:t>
-            </a:r>
-          </a:p>
-          <a:p>
-            <a:r>
-              <a:rPr lang="en-US" sz="1600" dirty="0" smtClean="0"/>
-              <a:t>-When finished, click Save button</a:t>
-            </a:r>
-          </a:p>
-          <a:p>
-            <a:endParaRPr lang="en-US" sz="1600" dirty="0"/>
-          </a:p>
-        </p:txBody>
-      </p:sp>
-      <p:sp>
-        <p:nvSpPr>
-          <p:cNvPr id="107" name="Minus 106"/>
+        </p:txBody>
+      </p:sp>
+      <p:sp>
+        <p:nvSpPr>
+          <p:cNvPr id="58" name="Minus 57"/>
           <p:cNvSpPr/>
           <p:nvPr/>
         </p:nvSpPr>
         <p:spPr>
           <a:xfrm>
-            <a:off x="3200400" y="2743200"/>
-            <a:ext cx="304800" cy="228600"/>
+            <a:off x="7543800" y="2819400"/>
+            <a:ext cx="381000" cy="381000"/>
           </a:xfrm>
           <a:prstGeom prst="mathMinus">
             <a:avLst/>
@@ -12973,24 +13296,57 @@
       </p:sp>
       <p:sp>
         <p:nvSpPr>
-          <p:cNvPr id="108" name="Rectangle 107"/>
+          <p:cNvPr id="59" name="TextBox 58"/>
+          <p:cNvSpPr txBox="1"/>
+          <p:nvPr/>
+        </p:nvSpPr>
+        <p:spPr>
+          <a:xfrm>
+            <a:off x="4953000" y="5867400"/>
+            <a:ext cx="3352800" cy="369332"/>
+          </a:xfrm>
+          <a:prstGeom prst="rect">
+            <a:avLst/>
+          </a:prstGeom>
+          <a:noFill/>
+        </p:spPr>
+        <p:txBody>
+          <a:bodyPr wrap="square" rtlCol="0">
+            <a:spAutoFit/>
+          </a:bodyPr>
+          <a:lstStyle/>
+          <a:p>
+            <a:pPr algn="ctr"/>
+            <a:r>
+              <a:rPr lang="en-US" b="1" dirty="0" smtClean="0">
+                <a:solidFill>
+                  <a:srgbClr val="FF0000"/>
+                </a:solidFill>
+              </a:rPr>
+              <a:t>User is added</a:t>
+            </a:r>
+            <a:endParaRPr lang="en-US" b="1" dirty="0">
+              <a:solidFill>
+                <a:srgbClr val="FF0000"/>
+              </a:solidFill>
+            </a:endParaRPr>
+          </a:p>
+        </p:txBody>
+      </p:sp>
+      <p:sp>
+        <p:nvSpPr>
+          <p:cNvPr id="61" name="Rectangle 60"/>
           <p:cNvSpPr/>
           <p:nvPr/>
         </p:nvSpPr>
         <p:spPr>
           <a:xfrm>
-            <a:off x="3124200" y="3429000"/>
-            <a:ext cx="457200" cy="457200"/>
-          </a:xfrm>
-          <a:prstGeom prst="rect">
-            <a:avLst/>
-          </a:prstGeom>
-          <a:noFill/>
-          <a:ln w="50800">
-            <a:solidFill>
-              <a:srgbClr val="FF0000"/>
-            </a:solidFill>
-          </a:ln>
+            <a:off x="4952999" y="5257800"/>
+            <a:ext cx="3397431" cy="609600"/>
+          </a:xfrm>
+          <a:prstGeom prst="rect">
+            <a:avLst/>
+          </a:prstGeom>
         </p:spPr>
         <p:style>
           <a:lnRef idx="2">
@@ -13019,163 +13375,18 @@
       </p:sp>
       <p:sp>
         <p:nvSpPr>
-          <p:cNvPr id="111" name="TextBox 110"/>
-          <p:cNvSpPr txBox="1"/>
-          <p:nvPr/>
-        </p:nvSpPr>
-        <p:spPr>
-          <a:xfrm>
-            <a:off x="4953000" y="5867400"/>
-            <a:ext cx="3352800" cy="369332"/>
-          </a:xfrm>
-          <a:prstGeom prst="rect">
-            <a:avLst/>
-          </a:prstGeom>
-          <a:noFill/>
-        </p:spPr>
-        <p:txBody>
-          <a:bodyPr wrap="square" rtlCol="0">
-            <a:spAutoFit/>
-          </a:bodyPr>
-          <a:lstStyle/>
-          <a:p>
-            <a:pPr algn="ctr"/>
-            <a:r>
-              <a:rPr lang="en-US" b="1" dirty="0" smtClean="0">
-                <a:solidFill>
-                  <a:srgbClr val="FF0000"/>
-                </a:solidFill>
-              </a:rPr>
-              <a:t>Save Changes</a:t>
-            </a:r>
-            <a:endParaRPr lang="en-US" b="1" dirty="0">
-              <a:solidFill>
-                <a:srgbClr val="FF0000"/>
-              </a:solidFill>
-            </a:endParaRPr>
-          </a:p>
-        </p:txBody>
-      </p:sp>
-      <p:sp>
-        <p:nvSpPr>
-          <p:cNvPr id="112" name="TextBox 111"/>
-          <p:cNvSpPr txBox="1"/>
-          <p:nvPr/>
-        </p:nvSpPr>
-        <p:spPr>
-          <a:xfrm>
-            <a:off x="1219200" y="4038600"/>
-            <a:ext cx="928278" cy="369332"/>
-          </a:xfrm>
-          <a:prstGeom prst="rect">
-            <a:avLst/>
-          </a:prstGeom>
-          <a:solidFill>
-            <a:schemeClr val="accent1">
-              <a:lumMod val="75000"/>
-            </a:schemeClr>
-          </a:solidFill>
-          <a:ln>
-            <a:solidFill>
-              <a:schemeClr val="accent1">
-                <a:lumMod val="75000"/>
-              </a:schemeClr>
-            </a:solidFill>
-          </a:ln>
-        </p:spPr>
-        <p:txBody>
-          <a:bodyPr wrap="square" rtlCol="0">
-            <a:spAutoFit/>
-          </a:bodyPr>
-          <a:lstStyle/>
-          <a:p>
-            <a:pPr algn="ctr"/>
-            <a:r>
-              <a:rPr lang="en-US" dirty="0" smtClean="0">
-                <a:solidFill>
-                  <a:srgbClr val="FFFFFF"/>
-                </a:solidFill>
-              </a:rPr>
-              <a:t>Save</a:t>
-            </a:r>
-            <a:endParaRPr lang="en-US" dirty="0">
-              <a:solidFill>
-                <a:srgbClr val="FFFFFF"/>
-              </a:solidFill>
-            </a:endParaRPr>
-          </a:p>
-        </p:txBody>
-      </p:sp>
-      <p:sp>
-        <p:nvSpPr>
-          <p:cNvPr id="116" name="TextBox 115"/>
-          <p:cNvSpPr txBox="1"/>
-          <p:nvPr/>
-        </p:nvSpPr>
-        <p:spPr>
-          <a:xfrm>
-            <a:off x="5715000" y="4191000"/>
-            <a:ext cx="928278" cy="369332"/>
-          </a:xfrm>
-          <a:prstGeom prst="rect">
-            <a:avLst/>
-          </a:prstGeom>
-          <a:solidFill>
-            <a:schemeClr val="accent1">
-              <a:lumMod val="75000"/>
-            </a:schemeClr>
-          </a:solidFill>
-          <a:ln>
-            <a:solidFill>
-              <a:schemeClr val="accent1">
-                <a:lumMod val="75000"/>
-              </a:schemeClr>
-            </a:solidFill>
-          </a:ln>
-        </p:spPr>
-        <p:txBody>
-          <a:bodyPr wrap="square" rtlCol="0">
-            <a:spAutoFit/>
-          </a:bodyPr>
-          <a:lstStyle/>
-          <a:p>
-            <a:pPr algn="ctr"/>
-            <a:r>
-              <a:rPr lang="en-US" dirty="0" smtClean="0">
-                <a:solidFill>
-                  <a:srgbClr val="FFFFFF"/>
-                </a:solidFill>
-              </a:rPr>
-              <a:t>Save</a:t>
-            </a:r>
-            <a:endParaRPr lang="en-US" dirty="0">
-              <a:solidFill>
-                <a:srgbClr val="FFFFFF"/>
-              </a:solidFill>
-            </a:endParaRPr>
-          </a:p>
-        </p:txBody>
-      </p:sp>
-      <p:sp>
-        <p:nvSpPr>
-          <p:cNvPr id="118" name="Rectangle 117"/>
+          <p:cNvPr id="62" name="Rectangle 61"/>
           <p:cNvSpPr/>
           <p:nvPr/>
         </p:nvSpPr>
         <p:spPr>
           <a:xfrm>
-            <a:off x="5638800" y="4114800"/>
-            <a:ext cx="1066800" cy="533400"/>
-          </a:xfrm>
-          <a:prstGeom prst="rect">
-            <a:avLst/>
-          </a:prstGeom>
-          <a:noFill/>
-          <a:ln w="50800">
-            <a:solidFill>
-              <a:srgbClr val="FF0000"/>
-            </a:solidFill>
-          </a:ln>
+            <a:off x="4953000" y="5257800"/>
+            <a:ext cx="3397431" cy="609600"/>
+          </a:xfrm>
+          <a:prstGeom prst="rect">
+            <a:avLst/>
+          </a:prstGeom>
         </p:spPr>
         <p:style>
           <a:lnRef idx="2">
@@ -13202,125 +13413,9 @@
           </a:p>
         </p:txBody>
       </p:sp>
-      <p:cxnSp>
-        <p:nvCxnSpPr>
-          <p:cNvPr id="120" name="Straight Arrow Connector 119"/>
-          <p:cNvCxnSpPr/>
-          <p:nvPr/>
-        </p:nvCxnSpPr>
-        <p:spPr>
-          <a:xfrm>
-            <a:off x="4114800" y="3048000"/>
-            <a:ext cx="739685" cy="0"/>
-          </a:xfrm>
-          <a:prstGeom prst="straightConnector1">
-            <a:avLst/>
-          </a:prstGeom>
-          <a:ln w="28575">
-            <a:solidFill>
-              <a:srgbClr val="FF0000"/>
-            </a:solidFill>
-            <a:tailEnd type="arrow"/>
-          </a:ln>
-        </p:spPr>
-        <p:style>
-          <a:lnRef idx="1">
-            <a:schemeClr val="accent1"/>
-          </a:lnRef>
-          <a:fillRef idx="0">
-            <a:schemeClr val="accent1"/>
-          </a:fillRef>
-          <a:effectRef idx="0">
-            <a:schemeClr val="accent1"/>
-          </a:effectRef>
-          <a:fontRef idx="minor">
-            <a:schemeClr val="tx1"/>
-          </a:fontRef>
-        </p:style>
-      </p:cxnSp>
-      <p:sp>
-        <p:nvSpPr>
-          <p:cNvPr id="121" name="Rectangle 120"/>
-          <p:cNvSpPr/>
-          <p:nvPr/>
-        </p:nvSpPr>
-        <p:spPr>
-          <a:xfrm>
-            <a:off x="457199" y="5257800"/>
-            <a:ext cx="3397431" cy="609600"/>
-          </a:xfrm>
-          <a:prstGeom prst="rect">
-            <a:avLst/>
-          </a:prstGeom>
-        </p:spPr>
-        <p:style>
-          <a:lnRef idx="2">
-            <a:schemeClr val="accent1">
-              <a:shade val="50000"/>
-            </a:schemeClr>
-          </a:lnRef>
-          <a:fillRef idx="1">
-            <a:schemeClr val="accent1"/>
-          </a:fillRef>
-          <a:effectRef idx="0">
-            <a:schemeClr val="accent1"/>
-          </a:effectRef>
-          <a:fontRef idx="minor">
-            <a:schemeClr val="lt1"/>
-          </a:fontRef>
-        </p:style>
-        <p:txBody>
-          <a:bodyPr rtlCol="0" anchor="ctr"/>
-          <a:lstStyle/>
-          <a:p>
-            <a:pPr algn="ctr"/>
-            <a:endParaRPr lang="en-US"/>
-          </a:p>
-        </p:txBody>
-      </p:sp>
-      <p:sp>
-        <p:nvSpPr>
-          <p:cNvPr id="122" name="Rectangle 121"/>
-          <p:cNvSpPr/>
-          <p:nvPr/>
-        </p:nvSpPr>
-        <p:spPr>
-          <a:xfrm>
-            <a:off x="457200" y="5257800"/>
-            <a:ext cx="3397431" cy="609600"/>
-          </a:xfrm>
-          <a:prstGeom prst="rect">
-            <a:avLst/>
-          </a:prstGeom>
-        </p:spPr>
-        <p:style>
-          <a:lnRef idx="2">
-            <a:schemeClr val="accent1">
-              <a:shade val="50000"/>
-            </a:schemeClr>
-          </a:lnRef>
-          <a:fillRef idx="1">
-            <a:schemeClr val="accent1"/>
-          </a:fillRef>
-          <a:effectRef idx="0">
-            <a:schemeClr val="accent1"/>
-          </a:effectRef>
-          <a:fontRef idx="minor">
-            <a:schemeClr val="lt1"/>
-          </a:fontRef>
-        </p:style>
-        <p:txBody>
-          <a:bodyPr rtlCol="0" anchor="ctr"/>
-          <a:lstStyle/>
-          <a:p>
-            <a:pPr algn="ctr"/>
-            <a:endParaRPr lang="en-US"/>
-          </a:p>
-        </p:txBody>
-      </p:sp>
       <p:pic>
         <p:nvPicPr>
-          <p:cNvPr id="123" name="Picture 122" descr="chat-4-24.png"/>
+          <p:cNvPr id="63" name="Picture 62" descr="chat-4-24.png"/>
           <p:cNvPicPr>
             <a:picLocks noChangeAspect="1"/>
           </p:cNvPicPr>
@@ -13340,7 +13435,7 @@
         </p:blipFill>
         <p:spPr>
           <a:xfrm>
-            <a:off x="1143000" y="5410200"/>
+            <a:off x="5638800" y="5410200"/>
             <a:ext cx="304800" cy="304800"/>
           </a:xfrm>
           <a:prstGeom prst="rect">
@@ -13350,7 +13445,7 @@
       </p:pic>
       <p:pic>
         <p:nvPicPr>
-          <p:cNvPr id="124" name="Picture 123" descr="student-24.png"/>
+          <p:cNvPr id="64" name="Picture 63" descr="student-24.png"/>
           <p:cNvPicPr>
             <a:picLocks noChangeAspect="1"/>
           </p:cNvPicPr>
@@ -13370,7 +13465,7 @@
         </p:blipFill>
         <p:spPr>
           <a:xfrm>
-            <a:off x="3352800" y="5410200"/>
+            <a:off x="7848600" y="5410200"/>
             <a:ext cx="304800" cy="304800"/>
           </a:xfrm>
           <a:prstGeom prst="rect">
@@ -13380,13 +13475,13 @@
       </p:pic>
       <p:sp>
         <p:nvSpPr>
-          <p:cNvPr id="125" name="Rounded Rectangle 124"/>
+          <p:cNvPr id="65" name="Rounded Rectangle 64"/>
           <p:cNvSpPr/>
           <p:nvPr/>
         </p:nvSpPr>
         <p:spPr>
           <a:xfrm>
-            <a:off x="1754777" y="5286103"/>
+            <a:off x="6250577" y="5286103"/>
             <a:ext cx="685800" cy="533400"/>
           </a:xfrm>
           <a:prstGeom prst="roundRect">
@@ -13427,7 +13522,7 @@
       </p:sp>
       <p:pic>
         <p:nvPicPr>
-          <p:cNvPr id="126" name="Picture 125" descr="gear-2-24.png"/>
+          <p:cNvPr id="66" name="Picture 65" descr="gear-2-24.png"/>
           <p:cNvPicPr>
             <a:picLocks noChangeAspect="1"/>
           </p:cNvPicPr>
@@ -13447,7 +13542,7 @@
         </p:blipFill>
         <p:spPr>
           <a:xfrm>
-            <a:off x="533400" y="5410200"/>
+            <a:off x="5029200" y="5410200"/>
             <a:ext cx="304800" cy="304800"/>
           </a:xfrm>
           <a:prstGeom prst="rect">
@@ -13457,7 +13552,7 @@
       </p:pic>
       <p:pic>
         <p:nvPicPr>
-          <p:cNvPr id="127" name="Picture 126" descr="search-13-24.png"/>
+          <p:cNvPr id="67" name="Picture 66" descr="search-13-24.png"/>
           <p:cNvPicPr>
             <a:picLocks noChangeAspect="1"/>
           </p:cNvPicPr>
@@ -13477,253 +13572,6 @@
         </p:blipFill>
         <p:spPr>
           <a:xfrm>
-            <a:off x="2743200" y="5410200"/>
-            <a:ext cx="304800" cy="304800"/>
-          </a:xfrm>
-          <a:prstGeom prst="rect">
-            <a:avLst/>
-          </a:prstGeom>
-        </p:spPr>
-      </p:pic>
-      <p:sp>
-        <p:nvSpPr>
-          <p:cNvPr id="128" name="Rectangle 127"/>
-          <p:cNvSpPr/>
-          <p:nvPr/>
-        </p:nvSpPr>
-        <p:spPr>
-          <a:xfrm>
-            <a:off x="4952999" y="5257800"/>
-            <a:ext cx="3397431" cy="609600"/>
-          </a:xfrm>
-          <a:prstGeom prst="rect">
-            <a:avLst/>
-          </a:prstGeom>
-        </p:spPr>
-        <p:style>
-          <a:lnRef idx="2">
-            <a:schemeClr val="accent1">
-              <a:shade val="50000"/>
-            </a:schemeClr>
-          </a:lnRef>
-          <a:fillRef idx="1">
-            <a:schemeClr val="accent1"/>
-          </a:fillRef>
-          <a:effectRef idx="0">
-            <a:schemeClr val="accent1"/>
-          </a:effectRef>
-          <a:fontRef idx="minor">
-            <a:schemeClr val="lt1"/>
-          </a:fontRef>
-        </p:style>
-        <p:txBody>
-          <a:bodyPr rtlCol="0" anchor="ctr"/>
-          <a:lstStyle/>
-          <a:p>
-            <a:pPr algn="ctr"/>
-            <a:endParaRPr lang="en-US"/>
-          </a:p>
-        </p:txBody>
-      </p:sp>
-      <p:sp>
-        <p:nvSpPr>
-          <p:cNvPr id="129" name="Rectangle 128"/>
-          <p:cNvSpPr/>
-          <p:nvPr/>
-        </p:nvSpPr>
-        <p:spPr>
-          <a:xfrm>
-            <a:off x="4953000" y="5257800"/>
-            <a:ext cx="3397431" cy="609600"/>
-          </a:xfrm>
-          <a:prstGeom prst="rect">
-            <a:avLst/>
-          </a:prstGeom>
-        </p:spPr>
-        <p:style>
-          <a:lnRef idx="2">
-            <a:schemeClr val="accent1">
-              <a:shade val="50000"/>
-            </a:schemeClr>
-          </a:lnRef>
-          <a:fillRef idx="1">
-            <a:schemeClr val="accent1"/>
-          </a:fillRef>
-          <a:effectRef idx="0">
-            <a:schemeClr val="accent1"/>
-          </a:effectRef>
-          <a:fontRef idx="minor">
-            <a:schemeClr val="lt1"/>
-          </a:fontRef>
-        </p:style>
-        <p:txBody>
-          <a:bodyPr rtlCol="0" anchor="ctr"/>
-          <a:lstStyle/>
-          <a:p>
-            <a:pPr algn="ctr"/>
-            <a:endParaRPr lang="en-US"/>
-          </a:p>
-        </p:txBody>
-      </p:sp>
-      <p:pic>
-        <p:nvPicPr>
-          <p:cNvPr id="130" name="Picture 129" descr="chat-4-24.png"/>
-          <p:cNvPicPr>
-            <a:picLocks noChangeAspect="1"/>
-          </p:cNvPicPr>
-          <p:nvPr/>
-        </p:nvPicPr>
-        <p:blipFill>
-          <a:blip r:embed="rId2">
-            <a:extLst>
-              <a:ext uri="{28A0092B-C50C-407E-A947-70E740481C1C}">
-                <a14:useLocalDpi xmlns:a14="http://schemas.microsoft.com/office/drawing/2010/main" val="0"/>
-              </a:ext>
-            </a:extLst>
-          </a:blip>
-          <a:stretch>
-            <a:fillRect/>
-          </a:stretch>
-        </p:blipFill>
-        <p:spPr>
-          <a:xfrm>
-            <a:off x="5638800" y="5410200"/>
-            <a:ext cx="304800" cy="304800"/>
-          </a:xfrm>
-          <a:prstGeom prst="rect">
-            <a:avLst/>
-          </a:prstGeom>
-        </p:spPr>
-      </p:pic>
-      <p:pic>
-        <p:nvPicPr>
-          <p:cNvPr id="131" name="Picture 130" descr="student-24.png"/>
-          <p:cNvPicPr>
-            <a:picLocks noChangeAspect="1"/>
-          </p:cNvPicPr>
-          <p:nvPr/>
-        </p:nvPicPr>
-        <p:blipFill>
-          <a:blip r:embed="rId3">
-            <a:extLst>
-              <a:ext uri="{28A0092B-C50C-407E-A947-70E740481C1C}">
-                <a14:useLocalDpi xmlns:a14="http://schemas.microsoft.com/office/drawing/2010/main" val="0"/>
-              </a:ext>
-            </a:extLst>
-          </a:blip>
-          <a:stretch>
-            <a:fillRect/>
-          </a:stretch>
-        </p:blipFill>
-        <p:spPr>
-          <a:xfrm>
-            <a:off x="7848600" y="5410200"/>
-            <a:ext cx="304800" cy="304800"/>
-          </a:xfrm>
-          <a:prstGeom prst="rect">
-            <a:avLst/>
-          </a:prstGeom>
-        </p:spPr>
-      </p:pic>
-      <p:sp>
-        <p:nvSpPr>
-          <p:cNvPr id="132" name="Rounded Rectangle 131"/>
-          <p:cNvSpPr/>
-          <p:nvPr/>
-        </p:nvSpPr>
-        <p:spPr>
-          <a:xfrm>
-            <a:off x="6250577" y="5286103"/>
-            <a:ext cx="685800" cy="533400"/>
-          </a:xfrm>
-          <a:prstGeom prst="roundRect">
-            <a:avLst/>
-          </a:prstGeom>
-          <a:noFill/>
-          <a:ln w="76200" cmpd="sng">
-            <a:solidFill>
-              <a:schemeClr val="accent1">
-                <a:lumMod val="75000"/>
-              </a:schemeClr>
-            </a:solidFill>
-          </a:ln>
-          <a:effectLst/>
-        </p:spPr>
-        <p:style>
-          <a:lnRef idx="1">
-            <a:schemeClr val="accent1"/>
-          </a:lnRef>
-          <a:fillRef idx="3">
-            <a:schemeClr val="accent1"/>
-          </a:fillRef>
-          <a:effectRef idx="2">
-            <a:schemeClr val="accent1"/>
-          </a:effectRef>
-          <a:fontRef idx="minor">
-            <a:schemeClr val="lt1"/>
-          </a:fontRef>
-        </p:style>
-        <p:txBody>
-          <a:bodyPr rtlCol="0" anchor="ctr"/>
-          <a:lstStyle/>
-          <a:p>
-            <a:pPr algn="ctr"/>
-            <a:endParaRPr lang="en-US"/>
-          </a:p>
-        </p:txBody>
-      </p:sp>
-      <p:pic>
-        <p:nvPicPr>
-          <p:cNvPr id="133" name="Picture 132" descr="gear-2-24.png"/>
-          <p:cNvPicPr>
-            <a:picLocks noChangeAspect="1"/>
-          </p:cNvPicPr>
-          <p:nvPr/>
-        </p:nvPicPr>
-        <p:blipFill>
-          <a:blip r:embed="rId4">
-            <a:extLst>
-              <a:ext uri="{28A0092B-C50C-407E-A947-70E740481C1C}">
-                <a14:useLocalDpi xmlns:a14="http://schemas.microsoft.com/office/drawing/2010/main" val="0"/>
-              </a:ext>
-            </a:extLst>
-          </a:blip>
-          <a:stretch>
-            <a:fillRect/>
-          </a:stretch>
-        </p:blipFill>
-        <p:spPr>
-          <a:xfrm>
-            <a:off x="5029200" y="5410200"/>
-            <a:ext cx="304800" cy="304800"/>
-          </a:xfrm>
-          <a:prstGeom prst="rect">
-            <a:avLst/>
-          </a:prstGeom>
-        </p:spPr>
-      </p:pic>
-      <p:pic>
-        <p:nvPicPr>
-          <p:cNvPr id="134" name="Picture 133" descr="search-13-24.png"/>
-          <p:cNvPicPr>
-            <a:picLocks noChangeAspect="1"/>
-          </p:cNvPicPr>
-          <p:nvPr/>
-        </p:nvPicPr>
-        <p:blipFill>
-          <a:blip r:embed="rId5">
-            <a:extLst>
-              <a:ext uri="{28A0092B-C50C-407E-A947-70E740481C1C}">
-                <a14:useLocalDpi xmlns:a14="http://schemas.microsoft.com/office/drawing/2010/main" val="0"/>
-              </a:ext>
-            </a:extLst>
-          </a:blip>
-          <a:stretch>
-            <a:fillRect/>
-          </a:stretch>
-        </p:blipFill>
-        <p:spPr>
-          <a:xfrm>
             <a:off x="7239000" y="5410200"/>
             <a:ext cx="304800" cy="304800"/>
           </a:xfrm>
@@ -13732,42 +13580,190 @@
           </a:prstGeom>
         </p:spPr>
       </p:pic>
-      <p:cxnSp>
-        <p:nvCxnSpPr>
-          <p:cNvPr id="41" name="Straight Arrow Connector 40"/>
-          <p:cNvCxnSpPr/>
-          <p:nvPr/>
-        </p:nvCxnSpPr>
-        <p:spPr>
-          <a:xfrm>
-            <a:off x="8610600" y="3048000"/>
-            <a:ext cx="381000" cy="0"/>
-          </a:xfrm>
-          <a:prstGeom prst="straightConnector1">
-            <a:avLst/>
-          </a:prstGeom>
-          <a:ln w="28575">
-            <a:solidFill>
-              <a:srgbClr val="FF0000"/>
-            </a:solidFill>
-            <a:tailEnd type="arrow"/>
-          </a:ln>
-        </p:spPr>
-        <p:style>
-          <a:lnRef idx="1">
-            <a:schemeClr val="accent1"/>
-          </a:lnRef>
-          <a:fillRef idx="0">
-            <a:schemeClr val="accent1"/>
-          </a:fillRef>
-          <a:effectRef idx="0">
-            <a:schemeClr val="accent1"/>
-          </a:effectRef>
-          <a:fontRef idx="minor">
-            <a:schemeClr val="tx1"/>
-          </a:fontRef>
-        </p:style>
-      </p:cxnSp>
+      <p:sp>
+        <p:nvSpPr>
+          <p:cNvPr id="68" name="TextBox 67"/>
+          <p:cNvSpPr txBox="1"/>
+          <p:nvPr/>
+        </p:nvSpPr>
+        <p:spPr>
+          <a:xfrm>
+            <a:off x="1219200" y="2133600"/>
+            <a:ext cx="1905000" cy="369332"/>
+          </a:xfrm>
+          <a:prstGeom prst="rect">
+            <a:avLst/>
+          </a:prstGeom>
+          <a:noFill/>
+        </p:spPr>
+        <p:txBody>
+          <a:bodyPr wrap="square" rtlCol="0">
+            <a:spAutoFit/>
+          </a:bodyPr>
+          <a:lstStyle/>
+          <a:p>
+            <a:r>
+              <a:rPr lang="en-US" dirty="0" smtClean="0">
+                <a:solidFill>
+                  <a:schemeClr val="tx2">
+                    <a:lumMod val="75000"/>
+                  </a:schemeClr>
+                </a:solidFill>
+                <a:latin typeface="Bradley Hand Bold"/>
+                <a:cs typeface="Bradley Hand Bold"/>
+              </a:rPr>
+              <a:t>Blocked List</a:t>
+            </a:r>
+            <a:endParaRPr lang="en-US" dirty="0">
+              <a:solidFill>
+                <a:schemeClr val="tx2">
+                  <a:lumMod val="75000"/>
+                </a:schemeClr>
+              </a:solidFill>
+              <a:latin typeface="Bradley Hand Bold"/>
+              <a:cs typeface="Bradley Hand Bold"/>
+            </a:endParaRPr>
+          </a:p>
+        </p:txBody>
+      </p:sp>
+      <p:sp>
+        <p:nvSpPr>
+          <p:cNvPr id="69" name="TextBox 68"/>
+          <p:cNvSpPr txBox="1"/>
+          <p:nvPr/>
+        </p:nvSpPr>
+        <p:spPr>
+          <a:xfrm>
+            <a:off x="5562600" y="2133600"/>
+            <a:ext cx="1905000" cy="369332"/>
+          </a:xfrm>
+          <a:prstGeom prst="rect">
+            <a:avLst/>
+          </a:prstGeom>
+          <a:noFill/>
+        </p:spPr>
+        <p:txBody>
+          <a:bodyPr wrap="square" rtlCol="0">
+            <a:spAutoFit/>
+          </a:bodyPr>
+          <a:lstStyle/>
+          <a:p>
+            <a:r>
+              <a:rPr lang="en-US" dirty="0" smtClean="0">
+                <a:solidFill>
+                  <a:schemeClr val="tx2">
+                    <a:lumMod val="75000"/>
+                  </a:schemeClr>
+                </a:solidFill>
+                <a:latin typeface="Bradley Hand Bold"/>
+                <a:cs typeface="Bradley Hand Bold"/>
+              </a:rPr>
+              <a:t>Blocked List</a:t>
+            </a:r>
+            <a:endParaRPr lang="en-US" dirty="0">
+              <a:solidFill>
+                <a:schemeClr val="tx2">
+                  <a:lumMod val="75000"/>
+                </a:schemeClr>
+              </a:solidFill>
+              <a:latin typeface="Bradley Hand Bold"/>
+              <a:cs typeface="Bradley Hand Bold"/>
+            </a:endParaRPr>
+          </a:p>
+        </p:txBody>
+      </p:sp>
+      <p:sp>
+        <p:nvSpPr>
+          <p:cNvPr id="70" name="TextBox 69"/>
+          <p:cNvSpPr txBox="1"/>
+          <p:nvPr/>
+        </p:nvSpPr>
+        <p:spPr>
+          <a:xfrm>
+            <a:off x="5562600" y="3657600"/>
+            <a:ext cx="2667000" cy="369332"/>
+          </a:xfrm>
+          <a:prstGeom prst="rect">
+            <a:avLst/>
+          </a:prstGeom>
+          <a:noFill/>
+        </p:spPr>
+        <p:txBody>
+          <a:bodyPr wrap="square" rtlCol="0">
+            <a:spAutoFit/>
+          </a:bodyPr>
+          <a:lstStyle/>
+          <a:p>
+            <a:r>
+              <a:rPr lang="en-US" dirty="0" smtClean="0">
+                <a:solidFill>
+                  <a:schemeClr val="tx2">
+                    <a:lumMod val="75000"/>
+                  </a:schemeClr>
+                </a:solidFill>
+                <a:latin typeface="Bradley Hand Bold"/>
+                <a:cs typeface="Bradley Hand Bold"/>
+              </a:rPr>
+              <a:t>Add user to Blocked List</a:t>
+            </a:r>
+            <a:endParaRPr lang="en-US" dirty="0">
+              <a:solidFill>
+                <a:schemeClr val="tx2">
+                  <a:lumMod val="75000"/>
+                </a:schemeClr>
+              </a:solidFill>
+              <a:latin typeface="Bradley Hand Bold"/>
+              <a:cs typeface="Bradley Hand Bold"/>
+            </a:endParaRPr>
+          </a:p>
+        </p:txBody>
+      </p:sp>
+      <p:sp>
+        <p:nvSpPr>
+          <p:cNvPr id="71" name="TextBox 70"/>
+          <p:cNvSpPr txBox="1"/>
+          <p:nvPr/>
+        </p:nvSpPr>
+        <p:spPr>
+          <a:xfrm>
+            <a:off x="1219200" y="3657600"/>
+            <a:ext cx="2667000" cy="369332"/>
+          </a:xfrm>
+          <a:prstGeom prst="rect">
+            <a:avLst/>
+          </a:prstGeom>
+          <a:noFill/>
+        </p:spPr>
+        <p:txBody>
+          <a:bodyPr wrap="square" rtlCol="0">
+            <a:spAutoFit/>
+          </a:bodyPr>
+          <a:lstStyle/>
+          <a:p>
+            <a:r>
+              <a:rPr lang="en-US" dirty="0" smtClean="0">
+                <a:solidFill>
+                  <a:schemeClr val="tx2">
+                    <a:lumMod val="75000"/>
+                  </a:schemeClr>
+                </a:solidFill>
+                <a:latin typeface="Bradley Hand Bold"/>
+                <a:cs typeface="Bradley Hand Bold"/>
+              </a:rPr>
+              <a:t>Add user to Blocked List</a:t>
+            </a:r>
+            <a:endParaRPr lang="en-US" dirty="0">
+              <a:solidFill>
+                <a:schemeClr val="tx2">
+                  <a:lumMod val="75000"/>
+                </a:schemeClr>
+              </a:solidFill>
+              <a:latin typeface="Bradley Hand Bold"/>
+              <a:cs typeface="Bradley Hand Bold"/>
+            </a:endParaRPr>
+          </a:p>
+        </p:txBody>
+      </p:sp>
     </p:spTree>
     <p:extLst>
       <p:ext uri="{BB962C8B-B14F-4D97-AF65-F5344CB8AC3E}">
@@ -13798,15 +13794,126 @@
           <a:chExt cx="0" cy="0"/>
         </a:xfrm>
       </p:grpSpPr>
-      <p:sp>
-        <p:nvSpPr>
-          <p:cNvPr id="4" name="Rectangle 3"/>
+      <p:cxnSp>
+        <p:nvCxnSpPr>
+          <p:cNvPr id="60" name="Straight Arrow Connector 59"/>
+          <p:cNvCxnSpPr/>
+          <p:nvPr/>
+        </p:nvCxnSpPr>
+        <p:spPr>
+          <a:xfrm>
+            <a:off x="4114800" y="3048000"/>
+            <a:ext cx="739685" cy="0"/>
+          </a:xfrm>
+          <a:prstGeom prst="straightConnector1">
+            <a:avLst/>
+          </a:prstGeom>
+          <a:ln w="28575">
+            <a:solidFill>
+              <a:srgbClr val="FF0000"/>
+            </a:solidFill>
+            <a:tailEnd type="arrow"/>
+          </a:ln>
+        </p:spPr>
+        <p:style>
+          <a:lnRef idx="1">
+            <a:schemeClr val="accent1"/>
+          </a:lnRef>
+          <a:fillRef idx="0">
+            <a:schemeClr val="accent1"/>
+          </a:fillRef>
+          <a:effectRef idx="0">
+            <a:schemeClr val="accent1"/>
+          </a:effectRef>
+          <a:fontRef idx="minor">
+            <a:schemeClr val="tx1"/>
+          </a:fontRef>
+        </p:style>
+      </p:cxnSp>
+      <p:cxnSp>
+        <p:nvCxnSpPr>
+          <p:cNvPr id="47" name="Straight Arrow Connector 46"/>
+          <p:cNvCxnSpPr/>
+          <p:nvPr/>
+        </p:nvCxnSpPr>
+        <p:spPr>
+          <a:xfrm>
+            <a:off x="152400" y="3048000"/>
+            <a:ext cx="304800" cy="0"/>
+          </a:xfrm>
+          <a:prstGeom prst="straightConnector1">
+            <a:avLst/>
+          </a:prstGeom>
+          <a:ln w="28575">
+            <a:solidFill>
+              <a:srgbClr val="FF0000"/>
+            </a:solidFill>
+            <a:tailEnd type="arrow"/>
+          </a:ln>
+        </p:spPr>
+        <p:style>
+          <a:lnRef idx="1">
+            <a:schemeClr val="accent1"/>
+          </a:lnRef>
+          <a:fillRef idx="0">
+            <a:schemeClr val="accent1"/>
+          </a:fillRef>
+          <a:effectRef idx="0">
+            <a:schemeClr val="accent1"/>
+          </a:effectRef>
+          <a:fontRef idx="minor">
+            <a:schemeClr val="tx1"/>
+          </a:fontRef>
+        </p:style>
+      </p:cxnSp>
+      <p:sp>
+        <p:nvSpPr>
+          <p:cNvPr id="48" name="TextBox 47"/>
+          <p:cNvSpPr txBox="1"/>
+          <p:nvPr/>
+        </p:nvSpPr>
+        <p:spPr>
+          <a:xfrm>
+            <a:off x="533400" y="5867400"/>
+            <a:ext cx="3352800" cy="369332"/>
+          </a:xfrm>
+          <a:prstGeom prst="rect">
+            <a:avLst/>
+          </a:prstGeom>
+          <a:noFill/>
+        </p:spPr>
+        <p:txBody>
+          <a:bodyPr wrap="square" rtlCol="0">
+            <a:spAutoFit/>
+          </a:bodyPr>
+          <a:lstStyle/>
+          <a:p>
+            <a:pPr algn="ctr"/>
+            <a:r>
+              <a:rPr lang="en-US" b="1" dirty="0" smtClean="0">
+                <a:solidFill>
+                  <a:srgbClr val="FF0000"/>
+                </a:solidFill>
+              </a:rPr>
+              <a:t>Remove User(s) from Block List</a:t>
+            </a:r>
+            <a:endParaRPr lang="en-US" b="1" dirty="0">
+              <a:solidFill>
+                <a:srgbClr val="FF0000"/>
+              </a:solidFill>
+            </a:endParaRPr>
+          </a:p>
+        </p:txBody>
+      </p:sp>
+      <p:sp>
+        <p:nvSpPr>
+          <p:cNvPr id="51" name="Rectangle 50"/>
           <p:cNvSpPr/>
           <p:nvPr/>
         </p:nvSpPr>
         <p:spPr>
           <a:xfrm>
-            <a:off x="533400" y="304800"/>
+            <a:off x="609600" y="304800"/>
             <a:ext cx="3397431" cy="5562600"/>
           </a:xfrm>
           <a:prstGeom prst="rect">
@@ -13827,11 +13934,6 @@
             <a:lin ang="15600000" scaled="0"/>
             <a:tileRect/>
           </a:gradFill>
-          <a:ln>
-            <a:solidFill>
-              <a:schemeClr val="accent1"/>
-            </a:solidFill>
-          </a:ln>
         </p:spPr>
         <p:style>
           <a:lnRef idx="2">
@@ -13860,14 +13962,261 @@
       </p:sp>
       <p:sp>
         <p:nvSpPr>
-          <p:cNvPr id="16" name="Rounded Rectangle 15"/>
+          <p:cNvPr id="58" name="Rectangle 57"/>
           <p:cNvSpPr/>
           <p:nvPr/>
         </p:nvSpPr>
         <p:spPr>
           <a:xfrm>
-            <a:off x="1295400" y="2404714"/>
-            <a:ext cx="1905000" cy="1100486"/>
+            <a:off x="609599" y="5257800"/>
+            <a:ext cx="3397431" cy="609600"/>
+          </a:xfrm>
+          <a:prstGeom prst="rect">
+            <a:avLst/>
+          </a:prstGeom>
+        </p:spPr>
+        <p:style>
+          <a:lnRef idx="2">
+            <a:schemeClr val="accent1">
+              <a:shade val="50000"/>
+            </a:schemeClr>
+          </a:lnRef>
+          <a:fillRef idx="1">
+            <a:schemeClr val="accent1"/>
+          </a:fillRef>
+          <a:effectRef idx="0">
+            <a:schemeClr val="accent1"/>
+          </a:effectRef>
+          <a:fontRef idx="minor">
+            <a:schemeClr val="lt1"/>
+          </a:fontRef>
+        </p:style>
+        <p:txBody>
+          <a:bodyPr rtlCol="0" anchor="ctr"/>
+          <a:lstStyle/>
+          <a:p>
+            <a:pPr algn="ctr"/>
+            <a:endParaRPr lang="en-US"/>
+          </a:p>
+        </p:txBody>
+      </p:sp>
+      <p:sp>
+        <p:nvSpPr>
+          <p:cNvPr id="59" name="Rectangle 58"/>
+          <p:cNvSpPr/>
+          <p:nvPr/>
+        </p:nvSpPr>
+        <p:spPr>
+          <a:xfrm>
+            <a:off x="609600" y="5257800"/>
+            <a:ext cx="3397431" cy="609600"/>
+          </a:xfrm>
+          <a:prstGeom prst="rect">
+            <a:avLst/>
+          </a:prstGeom>
+        </p:spPr>
+        <p:style>
+          <a:lnRef idx="2">
+            <a:schemeClr val="accent1">
+              <a:shade val="50000"/>
+            </a:schemeClr>
+          </a:lnRef>
+          <a:fillRef idx="1">
+            <a:schemeClr val="accent1"/>
+          </a:fillRef>
+          <a:effectRef idx="0">
+            <a:schemeClr val="accent1"/>
+          </a:effectRef>
+          <a:fontRef idx="minor">
+            <a:schemeClr val="lt1"/>
+          </a:fontRef>
+        </p:style>
+        <p:txBody>
+          <a:bodyPr rtlCol="0" anchor="ctr"/>
+          <a:lstStyle/>
+          <a:p>
+            <a:pPr algn="ctr"/>
+            <a:endParaRPr lang="en-US"/>
+          </a:p>
+        </p:txBody>
+      </p:sp>
+      <p:pic>
+        <p:nvPicPr>
+          <p:cNvPr id="75" name="Picture 74" descr="chat-4-24.png"/>
+          <p:cNvPicPr>
+            <a:picLocks noChangeAspect="1"/>
+          </p:cNvPicPr>
+          <p:nvPr/>
+        </p:nvPicPr>
+        <p:blipFill>
+          <a:blip r:embed="rId2">
+            <a:extLst>
+              <a:ext uri="{28A0092B-C50C-407E-A947-70E740481C1C}">
+                <a14:useLocalDpi xmlns:a14="http://schemas.microsoft.com/office/drawing/2010/main" val="0"/>
+              </a:ext>
+            </a:extLst>
+          </a:blip>
+          <a:stretch>
+            <a:fillRect/>
+          </a:stretch>
+        </p:blipFill>
+        <p:spPr>
+          <a:xfrm>
+            <a:off x="1295400" y="5410200"/>
+            <a:ext cx="304800" cy="304800"/>
+          </a:xfrm>
+          <a:prstGeom prst="rect">
+            <a:avLst/>
+          </a:prstGeom>
+        </p:spPr>
+      </p:pic>
+      <p:pic>
+        <p:nvPicPr>
+          <p:cNvPr id="76" name="Picture 75" descr="student-24.png"/>
+          <p:cNvPicPr>
+            <a:picLocks noChangeAspect="1"/>
+          </p:cNvPicPr>
+          <p:nvPr/>
+        </p:nvPicPr>
+        <p:blipFill>
+          <a:blip r:embed="rId3">
+            <a:extLst>
+              <a:ext uri="{28A0092B-C50C-407E-A947-70E740481C1C}">
+                <a14:useLocalDpi xmlns:a14="http://schemas.microsoft.com/office/drawing/2010/main" val="0"/>
+              </a:ext>
+            </a:extLst>
+          </a:blip>
+          <a:stretch>
+            <a:fillRect/>
+          </a:stretch>
+        </p:blipFill>
+        <p:spPr>
+          <a:xfrm>
+            <a:off x="3505200" y="5410200"/>
+            <a:ext cx="304800" cy="304800"/>
+          </a:xfrm>
+          <a:prstGeom prst="rect">
+            <a:avLst/>
+          </a:prstGeom>
+        </p:spPr>
+      </p:pic>
+      <p:sp>
+        <p:nvSpPr>
+          <p:cNvPr id="77" name="Rounded Rectangle 76"/>
+          <p:cNvSpPr/>
+          <p:nvPr/>
+        </p:nvSpPr>
+        <p:spPr>
+          <a:xfrm>
+            <a:off x="1907177" y="5286103"/>
+            <a:ext cx="685800" cy="533400"/>
+          </a:xfrm>
+          <a:prstGeom prst="roundRect">
+            <a:avLst/>
+          </a:prstGeom>
+          <a:noFill/>
+          <a:ln w="76200" cmpd="sng">
+            <a:solidFill>
+              <a:schemeClr val="accent1">
+                <a:lumMod val="75000"/>
+              </a:schemeClr>
+            </a:solidFill>
+          </a:ln>
+          <a:effectLst/>
+        </p:spPr>
+        <p:style>
+          <a:lnRef idx="1">
+            <a:schemeClr val="accent1"/>
+          </a:lnRef>
+          <a:fillRef idx="3">
+            <a:schemeClr val="accent1"/>
+          </a:fillRef>
+          <a:effectRef idx="2">
+            <a:schemeClr val="accent1"/>
+          </a:effectRef>
+          <a:fontRef idx="minor">
+            <a:schemeClr val="lt1"/>
+          </a:fontRef>
+        </p:style>
+        <p:txBody>
+          <a:bodyPr rtlCol="0" anchor="ctr"/>
+          <a:lstStyle/>
+          <a:p>
+            <a:pPr algn="ctr"/>
+            <a:endParaRPr lang="en-US"/>
+          </a:p>
+        </p:txBody>
+      </p:sp>
+      <p:pic>
+        <p:nvPicPr>
+          <p:cNvPr id="78" name="Picture 77" descr="gear-2-24.png"/>
+          <p:cNvPicPr>
+            <a:picLocks noChangeAspect="1"/>
+          </p:cNvPicPr>
+          <p:nvPr/>
+        </p:nvPicPr>
+        <p:blipFill>
+          <a:blip r:embed="rId4">
+            <a:extLst>
+              <a:ext uri="{28A0092B-C50C-407E-A947-70E740481C1C}">
+                <a14:useLocalDpi xmlns:a14="http://schemas.microsoft.com/office/drawing/2010/main" val="0"/>
+              </a:ext>
+            </a:extLst>
+          </a:blip>
+          <a:stretch>
+            <a:fillRect/>
+          </a:stretch>
+        </p:blipFill>
+        <p:spPr>
+          <a:xfrm>
+            <a:off x="685800" y="5410200"/>
+            <a:ext cx="304800" cy="304800"/>
+          </a:xfrm>
+          <a:prstGeom prst="rect">
+            <a:avLst/>
+          </a:prstGeom>
+        </p:spPr>
+      </p:pic>
+      <p:pic>
+        <p:nvPicPr>
+          <p:cNvPr id="79" name="Picture 78" descr="search-13-24.png"/>
+          <p:cNvPicPr>
+            <a:picLocks noChangeAspect="1"/>
+          </p:cNvPicPr>
+          <p:nvPr/>
+        </p:nvPicPr>
+        <p:blipFill>
+          <a:blip r:embed="rId5">
+            <a:extLst>
+              <a:ext uri="{28A0092B-C50C-407E-A947-70E740481C1C}">
+                <a14:useLocalDpi xmlns:a14="http://schemas.microsoft.com/office/drawing/2010/main" val="0"/>
+              </a:ext>
+            </a:extLst>
+          </a:blip>
+          <a:stretch>
+            <a:fillRect/>
+          </a:stretch>
+        </p:blipFill>
+        <p:spPr>
+          <a:xfrm>
+            <a:off x="2895600" y="5410200"/>
+            <a:ext cx="304800" cy="304800"/>
+          </a:xfrm>
+          <a:prstGeom prst="rect">
+            <a:avLst/>
+          </a:prstGeom>
+        </p:spPr>
+      </p:pic>
+      <p:sp>
+        <p:nvSpPr>
+          <p:cNvPr id="80" name="Rounded Rectangle 79"/>
+          <p:cNvSpPr/>
+          <p:nvPr/>
+        </p:nvSpPr>
+        <p:spPr>
+          <a:xfrm>
+            <a:off x="1219200" y="2514600"/>
+            <a:ext cx="1905000" cy="1024286"/>
           </a:xfrm>
           <a:prstGeom prst="roundRect">
             <a:avLst/>
@@ -13911,14 +14260,14 @@
       </p:sp>
       <p:sp>
         <p:nvSpPr>
-          <p:cNvPr id="18" name="Plus 17"/>
+          <p:cNvPr id="82" name="Plus 81"/>
           <p:cNvSpPr/>
           <p:nvPr/>
         </p:nvSpPr>
         <p:spPr>
           <a:xfrm>
-            <a:off x="3276600" y="3657600"/>
-            <a:ext cx="304800" cy="304800"/>
+            <a:off x="3200400" y="4038600"/>
+            <a:ext cx="381000" cy="381000"/>
           </a:xfrm>
           <a:prstGeom prst="mathPlus">
             <a:avLst/>
@@ -13959,13 +14308,13 @@
       </p:sp>
       <p:sp>
         <p:nvSpPr>
-          <p:cNvPr id="19" name="Rounded Rectangle 18"/>
+          <p:cNvPr id="83" name="Rounded Rectangle 82"/>
           <p:cNvSpPr/>
           <p:nvPr/>
         </p:nvSpPr>
         <p:spPr>
           <a:xfrm>
-            <a:off x="1295400" y="3623914"/>
+            <a:off x="1219200" y="4038600"/>
             <a:ext cx="1905000" cy="381000"/>
           </a:xfrm>
           <a:prstGeom prst="roundRect">
@@ -14010,44 +14359,14 @@
       </p:sp>
       <p:sp>
         <p:nvSpPr>
-          <p:cNvPr id="20" name="TextBox 19"/>
+          <p:cNvPr id="84" name="TextBox 83"/>
           <p:cNvSpPr txBox="1"/>
           <p:nvPr/>
         </p:nvSpPr>
         <p:spPr>
           <a:xfrm>
-            <a:off x="1295400" y="3657600"/>
-            <a:ext cx="1828800" cy="338554"/>
-          </a:xfrm>
-          <a:prstGeom prst="rect">
-            <a:avLst/>
-          </a:prstGeom>
-          <a:noFill/>
-        </p:spPr>
-        <p:txBody>
-          <a:bodyPr wrap="square" rtlCol="0">
-            <a:spAutoFit/>
-          </a:bodyPr>
-          <a:lstStyle/>
-          <a:p>
-            <a:r>
-              <a:rPr lang="en-US" sz="1600" dirty="0" smtClean="0"/>
-              <a:t>Username to Block</a:t>
-            </a:r>
-            <a:endParaRPr lang="en-US" sz="1600" dirty="0"/>
-          </a:p>
-        </p:txBody>
-      </p:sp>
-      <p:sp>
-        <p:nvSpPr>
-          <p:cNvPr id="22" name="TextBox 21"/>
-          <p:cNvSpPr txBox="1"/>
-          <p:nvPr/>
-        </p:nvSpPr>
-        <p:spPr>
-          <a:xfrm>
-            <a:off x="533400" y="457200"/>
-            <a:ext cx="3352800" cy="2154436"/>
+            <a:off x="609600" y="457200"/>
+            <a:ext cx="3352800" cy="1661993"/>
           </a:xfrm>
           <a:prstGeom prst="rect">
             <a:avLst/>
@@ -14070,38 +14389,29 @@
           </a:p>
           <a:p>
             <a:r>
-              <a:rPr lang="en-US" sz="1600" dirty="0" smtClean="0"/>
-              <a:t>-To add user to block list, type username into textbox and click the +</a:t>
+              <a:rPr lang="en-US" sz="1600" dirty="0"/>
+              <a:t>-To add user to block list, type username into textbox then click the +</a:t>
+            </a:r>
+          </a:p>
+          <a:p>
+            <a:r>
+              <a:rPr lang="en-US" sz="1600" dirty="0"/>
+              <a:t>-To remove user(s) from block list, select username(s) from blocked list then click the –</a:t>
             </a:r>
             <a:endParaRPr lang="en-US" sz="1600" dirty="0"/>
           </a:p>
-          <a:p>
-            <a:r>
-              <a:rPr lang="en-US" sz="1600" dirty="0" smtClean="0"/>
-              <a:t>-To remove user(s) from block list, click username(s) so username is highlighted, then click the –</a:t>
-            </a:r>
-          </a:p>
-          <a:p>
-            <a:r>
-              <a:rPr lang="en-US" sz="1600" dirty="0" smtClean="0"/>
-              <a:t>-When finished, click Save button</a:t>
-            </a:r>
-          </a:p>
-          <a:p>
-            <a:endParaRPr lang="en-US" sz="1600" dirty="0"/>
-          </a:p>
-        </p:txBody>
-      </p:sp>
-      <p:sp>
-        <p:nvSpPr>
-          <p:cNvPr id="23" name="Minus 22"/>
+        </p:txBody>
+      </p:sp>
+      <p:sp>
+        <p:nvSpPr>
+          <p:cNvPr id="85" name="Minus 84"/>
           <p:cNvSpPr/>
           <p:nvPr/>
         </p:nvSpPr>
         <p:spPr>
           <a:xfrm>
-            <a:off x="3276600" y="2819400"/>
-            <a:ext cx="304800" cy="228600"/>
+            <a:off x="3200400" y="2819400"/>
+            <a:ext cx="381000" cy="381000"/>
           </a:xfrm>
           <a:prstGeom prst="mathMinus">
             <a:avLst/>
@@ -14141,14 +14451,14 @@
       </p:sp>
       <p:sp>
         <p:nvSpPr>
-          <p:cNvPr id="25" name="TextBox 24"/>
+          <p:cNvPr id="87" name="TextBox 86"/>
           <p:cNvSpPr txBox="1"/>
           <p:nvPr/>
         </p:nvSpPr>
         <p:spPr>
           <a:xfrm>
-            <a:off x="533400" y="5867400"/>
-            <a:ext cx="3352800" cy="369332"/>
+            <a:off x="1219200" y="4038600"/>
+            <a:ext cx="1828800" cy="338554"/>
           </a:xfrm>
           <a:prstGeom prst="rect">
             <a:avLst/>
@@ -14161,123 +14471,20 @@
           </a:bodyPr>
           <a:lstStyle/>
           <a:p>
-            <a:pPr algn="ctr"/>
-            <a:r>
-              <a:rPr lang="en-US" b="1" dirty="0" smtClean="0">
-                <a:solidFill>
-                  <a:srgbClr val="FF0000"/>
-                </a:solidFill>
-              </a:rPr>
-              <a:t>Remove user(s) from Block List</a:t>
-            </a:r>
-            <a:endParaRPr lang="en-US" b="1" dirty="0">
-              <a:solidFill>
-                <a:srgbClr val="FF0000"/>
-              </a:solidFill>
-            </a:endParaRPr>
-          </a:p>
-        </p:txBody>
-      </p:sp>
-      <p:sp>
-        <p:nvSpPr>
-          <p:cNvPr id="26" name="Rectangle 25"/>
-          <p:cNvSpPr/>
-          <p:nvPr/>
-        </p:nvSpPr>
-        <p:spPr>
-          <a:xfrm>
-            <a:off x="1371600" y="2438400"/>
-            <a:ext cx="1752600" cy="304800"/>
-          </a:xfrm>
-          <a:prstGeom prst="rect">
-            <a:avLst/>
-          </a:prstGeom>
-          <a:solidFill>
-            <a:schemeClr val="accent1"/>
-          </a:solidFill>
-          <a:ln>
-            <a:noFill/>
-          </a:ln>
-          <a:effectLst/>
-        </p:spPr>
-        <p:style>
-          <a:lnRef idx="1">
-            <a:schemeClr val="accent1"/>
-          </a:lnRef>
-          <a:fillRef idx="3">
-            <a:schemeClr val="accent1"/>
-          </a:fillRef>
-          <a:effectRef idx="2">
-            <a:schemeClr val="accent1"/>
-          </a:effectRef>
-          <a:fontRef idx="minor">
-            <a:schemeClr val="lt1"/>
-          </a:fontRef>
-        </p:style>
-        <p:txBody>
-          <a:bodyPr rtlCol="0" anchor="ctr"/>
-          <a:lstStyle/>
-          <a:p>
-            <a:pPr algn="ctr"/>
-            <a:endParaRPr lang="en-US"/>
-          </a:p>
-        </p:txBody>
-      </p:sp>
-      <p:sp>
-        <p:nvSpPr>
-          <p:cNvPr id="27" name="Rectangle 26"/>
-          <p:cNvSpPr/>
-          <p:nvPr/>
-        </p:nvSpPr>
-        <p:spPr>
-          <a:xfrm>
-            <a:off x="1371600" y="3200400"/>
-            <a:ext cx="1752600" cy="228600"/>
-          </a:xfrm>
-          <a:prstGeom prst="rect">
-            <a:avLst/>
-          </a:prstGeom>
-          <a:solidFill>
-            <a:schemeClr val="accent1"/>
-          </a:solidFill>
-          <a:ln>
-            <a:noFill/>
-          </a:ln>
-          <a:effectLst/>
-        </p:spPr>
-        <p:style>
-          <a:lnRef idx="1">
-            <a:schemeClr val="accent1"/>
-          </a:lnRef>
-          <a:fillRef idx="3">
-            <a:schemeClr val="accent1"/>
-          </a:fillRef>
-          <a:effectRef idx="2">
-            <a:schemeClr val="accent1"/>
-          </a:effectRef>
-          <a:fontRef idx="minor">
-            <a:schemeClr val="lt1"/>
-          </a:fontRef>
-        </p:style>
-        <p:txBody>
-          <a:bodyPr rtlCol="0" anchor="ctr"/>
-          <a:lstStyle/>
-          <a:p>
-            <a:pPr algn="ctr"/>
-            <a:endParaRPr lang="en-US"/>
-          </a:p>
-        </p:txBody>
-      </p:sp>
-      <p:sp>
-        <p:nvSpPr>
-          <p:cNvPr id="28" name="TextBox 27"/>
+            <a:endParaRPr lang="en-US" sz="1600" dirty="0"/>
+          </a:p>
+        </p:txBody>
+      </p:sp>
+      <p:sp>
+        <p:nvSpPr>
+          <p:cNvPr id="88" name="TextBox 87"/>
           <p:cNvSpPr txBox="1"/>
           <p:nvPr/>
         </p:nvSpPr>
         <p:spPr>
           <a:xfrm>
-            <a:off x="1295400" y="2438400"/>
-            <a:ext cx="1828800" cy="1323439"/>
+            <a:off x="1219200" y="2133600"/>
+            <a:ext cx="1905000" cy="369332"/>
           </a:xfrm>
           <a:prstGeom prst="rect">
             <a:avLst/>
@@ -14291,43 +14498,85 @@
           <a:lstStyle/>
           <a:p>
             <a:r>
-              <a:rPr lang="en-US" sz="1600" dirty="0" smtClean="0"/>
-              <a:t>ZacAttack688</a:t>
-            </a:r>
-          </a:p>
-          <a:p>
-            <a:r>
-              <a:rPr lang="en-US" sz="1600" dirty="0" smtClean="0"/>
-              <a:t>Opossums4Lyfe</a:t>
-            </a:r>
-          </a:p>
-          <a:p>
-            <a:r>
-              <a:rPr lang="en-US" sz="1600" dirty="0" smtClean="0"/>
-              <a:t>DoucheMcGouche</a:t>
-            </a:r>
-          </a:p>
-          <a:p>
-            <a:r>
-              <a:rPr lang="en-US" sz="1600" dirty="0" smtClean="0"/>
-              <a:t>BigBadChad90</a:t>
-            </a:r>
-          </a:p>
-          <a:p>
-            <a:endParaRPr lang="en-US" sz="1600" dirty="0"/>
-          </a:p>
-        </p:txBody>
-      </p:sp>
-      <p:sp>
-        <p:nvSpPr>
-          <p:cNvPr id="29" name="Rectangle 28"/>
+              <a:rPr lang="en-US" dirty="0" smtClean="0">
+                <a:solidFill>
+                  <a:schemeClr val="tx2">
+                    <a:lumMod val="75000"/>
+                  </a:schemeClr>
+                </a:solidFill>
+                <a:latin typeface="Bradley Hand Bold"/>
+                <a:cs typeface="Bradley Hand Bold"/>
+              </a:rPr>
+              <a:t>Blocked List</a:t>
+            </a:r>
+            <a:endParaRPr lang="en-US" dirty="0">
+              <a:solidFill>
+                <a:schemeClr val="tx2">
+                  <a:lumMod val="75000"/>
+                </a:schemeClr>
+              </a:solidFill>
+              <a:latin typeface="Bradley Hand Bold"/>
+              <a:cs typeface="Bradley Hand Bold"/>
+            </a:endParaRPr>
+          </a:p>
+        </p:txBody>
+      </p:sp>
+      <p:sp>
+        <p:nvSpPr>
+          <p:cNvPr id="89" name="TextBox 88"/>
+          <p:cNvSpPr txBox="1"/>
+          <p:nvPr/>
+        </p:nvSpPr>
+        <p:spPr>
+          <a:xfrm>
+            <a:off x="1219200" y="3657600"/>
+            <a:ext cx="2667000" cy="369332"/>
+          </a:xfrm>
+          <a:prstGeom prst="rect">
+            <a:avLst/>
+          </a:prstGeom>
+          <a:noFill/>
+        </p:spPr>
+        <p:txBody>
+          <a:bodyPr wrap="square" rtlCol="0">
+            <a:spAutoFit/>
+          </a:bodyPr>
+          <a:lstStyle/>
+          <a:p>
+            <a:r>
+              <a:rPr lang="en-US" dirty="0" smtClean="0">
+                <a:solidFill>
+                  <a:schemeClr val="tx2">
+                    <a:lumMod val="75000"/>
+                  </a:schemeClr>
+                </a:solidFill>
+                <a:latin typeface="Bradley Hand Bold"/>
+                <a:cs typeface="Bradley Hand Bold"/>
+              </a:rPr>
+              <a:t>Add user to Blocked List</a:t>
+            </a:r>
+            <a:endParaRPr lang="en-US" dirty="0">
+              <a:solidFill>
+                <a:schemeClr val="tx2">
+                  <a:lumMod val="75000"/>
+                </a:schemeClr>
+              </a:solidFill>
+              <a:latin typeface="Bradley Hand Bold"/>
+              <a:cs typeface="Bradley Hand Bold"/>
+            </a:endParaRPr>
+          </a:p>
+        </p:txBody>
+      </p:sp>
+      <p:sp>
+        <p:nvSpPr>
+          <p:cNvPr id="90" name="Rectangle 89"/>
           <p:cNvSpPr/>
           <p:nvPr/>
         </p:nvSpPr>
         <p:spPr>
           <a:xfrm>
-            <a:off x="3200400" y="2667000"/>
-            <a:ext cx="457200" cy="533400"/>
+            <a:off x="3200400" y="2819400"/>
+            <a:ext cx="381000" cy="381000"/>
           </a:xfrm>
           <a:prstGeom prst="rect">
             <a:avLst/>
@@ -14366,7 +14615,147 @@
       </p:sp>
       <p:sp>
         <p:nvSpPr>
-          <p:cNvPr id="30" name="Rectangle 29"/>
+          <p:cNvPr id="91" name="Rectangle 90"/>
+          <p:cNvSpPr/>
+          <p:nvPr/>
+        </p:nvSpPr>
+        <p:spPr>
+          <a:xfrm>
+            <a:off x="1295400" y="2514600"/>
+            <a:ext cx="1752600" cy="304800"/>
+          </a:xfrm>
+          <a:prstGeom prst="rect">
+            <a:avLst/>
+          </a:prstGeom>
+          <a:solidFill>
+            <a:schemeClr val="accent1"/>
+          </a:solidFill>
+          <a:ln>
+            <a:noFill/>
+          </a:ln>
+          <a:effectLst/>
+        </p:spPr>
+        <p:style>
+          <a:lnRef idx="1">
+            <a:schemeClr val="accent1"/>
+          </a:lnRef>
+          <a:fillRef idx="3">
+            <a:schemeClr val="accent1"/>
+          </a:fillRef>
+          <a:effectRef idx="2">
+            <a:schemeClr val="accent1"/>
+          </a:effectRef>
+          <a:fontRef idx="minor">
+            <a:schemeClr val="lt1"/>
+          </a:fontRef>
+        </p:style>
+        <p:txBody>
+          <a:bodyPr rtlCol="0" anchor="ctr"/>
+          <a:lstStyle/>
+          <a:p>
+            <a:pPr algn="ctr"/>
+            <a:endParaRPr lang="en-US"/>
+          </a:p>
+        </p:txBody>
+      </p:sp>
+      <p:sp>
+        <p:nvSpPr>
+          <p:cNvPr id="92" name="Rectangle 91"/>
+          <p:cNvSpPr/>
+          <p:nvPr/>
+        </p:nvSpPr>
+        <p:spPr>
+          <a:xfrm>
+            <a:off x="1295400" y="3276600"/>
+            <a:ext cx="1752600" cy="228600"/>
+          </a:xfrm>
+          <a:prstGeom prst="rect">
+            <a:avLst/>
+          </a:prstGeom>
+          <a:solidFill>
+            <a:schemeClr val="accent1"/>
+          </a:solidFill>
+          <a:ln>
+            <a:noFill/>
+          </a:ln>
+          <a:effectLst/>
+        </p:spPr>
+        <p:style>
+          <a:lnRef idx="1">
+            <a:schemeClr val="accent1"/>
+          </a:lnRef>
+          <a:fillRef idx="3">
+            <a:schemeClr val="accent1"/>
+          </a:fillRef>
+          <a:effectRef idx="2">
+            <a:schemeClr val="accent1"/>
+          </a:effectRef>
+          <a:fontRef idx="minor">
+            <a:schemeClr val="lt1"/>
+          </a:fontRef>
+        </p:style>
+        <p:txBody>
+          <a:bodyPr rtlCol="0" anchor="ctr"/>
+          <a:lstStyle/>
+          <a:p>
+            <a:pPr algn="ctr"/>
+            <a:endParaRPr lang="en-US"/>
+          </a:p>
+        </p:txBody>
+      </p:sp>
+      <p:sp>
+        <p:nvSpPr>
+          <p:cNvPr id="93" name="TextBox 92"/>
+          <p:cNvSpPr txBox="1"/>
+          <p:nvPr/>
+        </p:nvSpPr>
+        <p:spPr>
+          <a:xfrm>
+            <a:off x="1219200" y="2514600"/>
+            <a:ext cx="1828800" cy="1323439"/>
+          </a:xfrm>
+          <a:prstGeom prst="rect">
+            <a:avLst/>
+          </a:prstGeom>
+          <a:noFill/>
+        </p:spPr>
+        <p:txBody>
+          <a:bodyPr wrap="square" rtlCol="0">
+            <a:spAutoFit/>
+          </a:bodyPr>
+          <a:lstStyle/>
+          <a:p>
+            <a:r>
+              <a:rPr lang="en-US" sz="1600" dirty="0" smtClean="0"/>
+              <a:t>ZacAttack688</a:t>
+            </a:r>
+          </a:p>
+          <a:p>
+            <a:r>
+              <a:rPr lang="en-US" sz="1600" dirty="0" smtClean="0"/>
+              <a:t>Opossums4Lyfe</a:t>
+            </a:r>
+          </a:p>
+          <a:p>
+            <a:r>
+              <a:rPr lang="en-US" sz="1600" dirty="0" smtClean="0"/>
+              <a:t>DoucheMcGouche</a:t>
+            </a:r>
+          </a:p>
+          <a:p>
+            <a:r>
+              <a:rPr lang="en-US" sz="1600" dirty="0" smtClean="0"/>
+              <a:t>BigBadChad90</a:t>
+            </a:r>
+          </a:p>
+          <a:p>
+            <a:endParaRPr lang="en-US" sz="1600" dirty="0"/>
+          </a:p>
+        </p:txBody>
+      </p:sp>
+      <p:sp>
+        <p:nvSpPr>
+          <p:cNvPr id="111" name="Rectangle 110"/>
           <p:cNvSpPr/>
           <p:nvPr/>
         </p:nvSpPr>
@@ -14421,14 +14810,14 @@
       </p:sp>
       <p:sp>
         <p:nvSpPr>
-          <p:cNvPr id="42" name="Rounded Rectangle 41"/>
+          <p:cNvPr id="112" name="Rounded Rectangle 111"/>
           <p:cNvSpPr/>
           <p:nvPr/>
         </p:nvSpPr>
         <p:spPr>
           <a:xfrm>
-            <a:off x="5715000" y="2404714"/>
-            <a:ext cx="1905000" cy="948086"/>
+            <a:off x="5562600" y="2514600"/>
+            <a:ext cx="1905000" cy="1024286"/>
           </a:xfrm>
           <a:prstGeom prst="roundRect">
             <a:avLst/>
@@ -14472,13 +14861,13 @@
       </p:sp>
       <p:sp>
         <p:nvSpPr>
-          <p:cNvPr id="43" name="TextBox 42"/>
+          <p:cNvPr id="113" name="TextBox 112"/>
           <p:cNvSpPr txBox="1"/>
           <p:nvPr/>
         </p:nvSpPr>
         <p:spPr>
           <a:xfrm>
-            <a:off x="5715000" y="2438400"/>
+            <a:off x="5562600" y="2514600"/>
             <a:ext cx="1828800" cy="584776"/>
           </a:xfrm>
           <a:prstGeom prst="rect">
@@ -14508,14 +14897,14 @@
       </p:sp>
       <p:sp>
         <p:nvSpPr>
-          <p:cNvPr id="44" name="Plus 43"/>
+          <p:cNvPr id="114" name="Plus 113"/>
           <p:cNvSpPr/>
           <p:nvPr/>
         </p:nvSpPr>
         <p:spPr>
           <a:xfrm>
-            <a:off x="7696200" y="3505200"/>
-            <a:ext cx="304800" cy="304800"/>
+            <a:off x="7543800" y="4038600"/>
+            <a:ext cx="381000" cy="381000"/>
           </a:xfrm>
           <a:prstGeom prst="mathPlus">
             <a:avLst/>
@@ -14556,13 +14945,13 @@
       </p:sp>
       <p:sp>
         <p:nvSpPr>
-          <p:cNvPr id="45" name="Rounded Rectangle 44"/>
+          <p:cNvPr id="115" name="Rounded Rectangle 114"/>
           <p:cNvSpPr/>
           <p:nvPr/>
         </p:nvSpPr>
         <p:spPr>
           <a:xfrm>
-            <a:off x="5715000" y="3471514"/>
+            <a:off x="5562600" y="4038600"/>
             <a:ext cx="1905000" cy="381000"/>
           </a:xfrm>
           <a:prstGeom prst="roundRect">
@@ -14607,44 +14996,14 @@
       </p:sp>
       <p:sp>
         <p:nvSpPr>
-          <p:cNvPr id="46" name="TextBox 45"/>
+          <p:cNvPr id="116" name="TextBox 115"/>
           <p:cNvSpPr txBox="1"/>
           <p:nvPr/>
         </p:nvSpPr>
         <p:spPr>
           <a:xfrm>
-            <a:off x="5715000" y="3505200"/>
-            <a:ext cx="1828800" cy="338554"/>
-          </a:xfrm>
-          <a:prstGeom prst="rect">
-            <a:avLst/>
-          </a:prstGeom>
-          <a:noFill/>
-        </p:spPr>
-        <p:txBody>
-          <a:bodyPr wrap="square" rtlCol="0">
-            <a:spAutoFit/>
-          </a:bodyPr>
-          <a:lstStyle/>
-          <a:p>
-            <a:r>
-              <a:rPr lang="en-US" sz="1600" dirty="0" smtClean="0"/>
-              <a:t>Username to Block</a:t>
-            </a:r>
-            <a:endParaRPr lang="en-US" sz="1600" dirty="0"/>
-          </a:p>
-        </p:txBody>
-      </p:sp>
-      <p:sp>
-        <p:nvSpPr>
-          <p:cNvPr id="49" name="TextBox 48"/>
-          <p:cNvSpPr txBox="1"/>
-          <p:nvPr/>
-        </p:nvSpPr>
-        <p:spPr>
-          <a:xfrm>
             <a:off x="4953000" y="457200"/>
-            <a:ext cx="3352800" cy="2154436"/>
+            <a:ext cx="3352800" cy="1661993"/>
           </a:xfrm>
           <a:prstGeom prst="rect">
             <a:avLst/>
@@ -14667,38 +15026,48 @@
           </a:p>
           <a:p>
             <a:r>
+              <a:rPr lang="en-US" sz="1600" dirty="0"/>
+              <a:t>-To add user to block list, type username into textbox then click the +</a:t>
+            </a:r>
+          </a:p>
+          <a:p>
+            <a:r>
+              <a:rPr lang="en-US" sz="1600" dirty="0"/>
+              <a:t>-To remove user(s) from block list, select username(s) </a:t>
+            </a:r>
+            <a:r>
               <a:rPr lang="en-US" sz="1600" dirty="0" smtClean="0"/>
-              <a:t>-To add user to block list, type username into textbox and click the +</a:t>
-            </a:r>
-            <a:endParaRPr lang="en-US" sz="1600" dirty="0"/>
-          </a:p>
-          <a:p>
+              <a:t>from </a:t>
+            </a:r>
+            <a:r>
+              <a:rPr lang="en-US" sz="1600" dirty="0"/>
+              <a:t>b</a:t>
+            </a:r>
             <a:r>
               <a:rPr lang="en-US" sz="1600" dirty="0" smtClean="0"/>
-              <a:t>-To remove user(s) from block list, click username(s) so username is highlighted, then click the –</a:t>
-            </a:r>
-          </a:p>
-          <a:p>
+              <a:t>locked list</a:t>
+            </a:r>
             <a:r>
               <a:rPr lang="en-US" sz="1600" dirty="0" smtClean="0"/>
-              <a:t>-When finished, click Save button</a:t>
-            </a:r>
-          </a:p>
-          <a:p>
-            <a:endParaRPr lang="en-US" sz="1600" dirty="0"/>
-          </a:p>
-        </p:txBody>
-      </p:sp>
-      <p:sp>
-        <p:nvSpPr>
-          <p:cNvPr id="50" name="Minus 49"/>
+              <a:t> then click </a:t>
+            </a:r>
+            <a:r>
+              <a:rPr lang="en-US" sz="1600" dirty="0"/>
+              <a:t>the –</a:t>
+            </a:r>
+          </a:p>
+        </p:txBody>
+      </p:sp>
+      <p:sp>
+        <p:nvSpPr>
+          <p:cNvPr id="117" name="Minus 116"/>
           <p:cNvSpPr/>
           <p:nvPr/>
         </p:nvSpPr>
         <p:spPr>
           <a:xfrm>
-            <a:off x="7696200" y="2819400"/>
-            <a:ext cx="304800" cy="228600"/>
+            <a:off x="7543800" y="2819400"/>
+            <a:ext cx="381000" cy="381000"/>
           </a:xfrm>
           <a:prstGeom prst="mathMinus">
             <a:avLst/>
@@ -14738,7 +15107,7 @@
       </p:sp>
       <p:sp>
         <p:nvSpPr>
-          <p:cNvPr id="52" name="TextBox 51"/>
+          <p:cNvPr id="118" name="TextBox 117"/>
           <p:cNvSpPr txBox="1"/>
           <p:nvPr/>
         </p:nvSpPr>
@@ -14765,7 +15134,7 @@
                   <a:srgbClr val="FF0000"/>
                 </a:solidFill>
               </a:rPr>
-              <a:t>Save Changes</a:t>
+              <a:t>User(s) are removed</a:t>
             </a:r>
             <a:endParaRPr lang="en-US" b="1" dirty="0">
               <a:solidFill>
@@ -14777,24 +15146,18 @@
       </p:sp>
       <p:sp>
         <p:nvSpPr>
-          <p:cNvPr id="53" name="Rectangle 52"/>
+          <p:cNvPr id="119" name="Rectangle 118"/>
           <p:cNvSpPr/>
           <p:nvPr/>
         </p:nvSpPr>
         <p:spPr>
           <a:xfrm>
-            <a:off x="5638800" y="3962400"/>
-            <a:ext cx="1066800" cy="533400"/>
-          </a:xfrm>
-          <a:prstGeom prst="rect">
-            <a:avLst/>
-          </a:prstGeom>
-          <a:noFill/>
-          <a:ln w="50800">
-            <a:solidFill>
-              <a:srgbClr val="FF0000"/>
-            </a:solidFill>
-          </a:ln>
+            <a:off x="4952999" y="5257800"/>
+            <a:ext cx="3397431" cy="609600"/>
+          </a:xfrm>
+          <a:prstGeom prst="rect">
+            <a:avLst/>
+          </a:prstGeom>
         </p:spPr>
         <p:style>
           <a:lnRef idx="2">
@@ -14823,149 +15186,13 @@
       </p:sp>
       <p:sp>
         <p:nvSpPr>
-          <p:cNvPr id="54" name="TextBox 53"/>
-          <p:cNvSpPr txBox="1"/>
-          <p:nvPr/>
-        </p:nvSpPr>
-        <p:spPr>
-          <a:xfrm>
-            <a:off x="5715000" y="4038600"/>
-            <a:ext cx="928278" cy="369332"/>
-          </a:xfrm>
-          <a:prstGeom prst="rect">
-            <a:avLst/>
-          </a:prstGeom>
-          <a:solidFill>
-            <a:schemeClr val="accent1">
-              <a:lumMod val="75000"/>
-            </a:schemeClr>
-          </a:solidFill>
-          <a:ln>
-            <a:solidFill>
-              <a:schemeClr val="accent1">
-                <a:lumMod val="75000"/>
-              </a:schemeClr>
-            </a:solidFill>
-          </a:ln>
-        </p:spPr>
-        <p:txBody>
-          <a:bodyPr wrap="square" rtlCol="0">
-            <a:spAutoFit/>
-          </a:bodyPr>
-          <a:lstStyle/>
-          <a:p>
-            <a:pPr algn="ctr"/>
-            <a:r>
-              <a:rPr lang="en-US" dirty="0" smtClean="0">
-                <a:solidFill>
-                  <a:srgbClr val="FFFFFF"/>
-                </a:solidFill>
-              </a:rPr>
-              <a:t>Save</a:t>
-            </a:r>
-            <a:endParaRPr lang="en-US" dirty="0">
-              <a:solidFill>
-                <a:srgbClr val="FFFFFF"/>
-              </a:solidFill>
-            </a:endParaRPr>
-          </a:p>
-        </p:txBody>
-      </p:sp>
-      <p:sp>
-        <p:nvSpPr>
-          <p:cNvPr id="56" name="TextBox 55"/>
-          <p:cNvSpPr txBox="1"/>
-          <p:nvPr/>
-        </p:nvSpPr>
-        <p:spPr>
-          <a:xfrm>
-            <a:off x="1295400" y="4114800"/>
-            <a:ext cx="928278" cy="369332"/>
-          </a:xfrm>
-          <a:prstGeom prst="rect">
-            <a:avLst/>
-          </a:prstGeom>
-          <a:solidFill>
-            <a:schemeClr val="accent1">
-              <a:lumMod val="75000"/>
-            </a:schemeClr>
-          </a:solidFill>
-          <a:ln>
-            <a:solidFill>
-              <a:schemeClr val="accent1">
-                <a:lumMod val="75000"/>
-              </a:schemeClr>
-            </a:solidFill>
-          </a:ln>
-        </p:spPr>
-        <p:txBody>
-          <a:bodyPr wrap="square" rtlCol="0">
-            <a:spAutoFit/>
-          </a:bodyPr>
-          <a:lstStyle/>
-          <a:p>
-            <a:pPr algn="ctr"/>
-            <a:r>
-              <a:rPr lang="en-US" dirty="0" smtClean="0">
-                <a:solidFill>
-                  <a:srgbClr val="FFFFFF"/>
-                </a:solidFill>
-              </a:rPr>
-              <a:t>Save</a:t>
-            </a:r>
-            <a:endParaRPr lang="en-US" dirty="0">
-              <a:solidFill>
-                <a:srgbClr val="FFFFFF"/>
-              </a:solidFill>
-            </a:endParaRPr>
-          </a:p>
-        </p:txBody>
-      </p:sp>
-      <p:cxnSp>
-        <p:nvCxnSpPr>
-          <p:cNvPr id="60" name="Straight Arrow Connector 59"/>
-          <p:cNvCxnSpPr/>
-          <p:nvPr/>
-        </p:nvCxnSpPr>
-        <p:spPr>
-          <a:xfrm>
-            <a:off x="4114800" y="3048000"/>
-            <a:ext cx="739685" cy="0"/>
-          </a:xfrm>
-          <a:prstGeom prst="straightConnector1">
-            <a:avLst/>
-          </a:prstGeom>
-          <a:ln w="28575">
-            <a:solidFill>
-              <a:srgbClr val="FF0000"/>
-            </a:solidFill>
-            <a:tailEnd type="arrow"/>
-          </a:ln>
-        </p:spPr>
-        <p:style>
-          <a:lnRef idx="1">
-            <a:schemeClr val="accent1"/>
-          </a:lnRef>
-          <a:fillRef idx="0">
-            <a:schemeClr val="accent1"/>
-          </a:fillRef>
-          <a:effectRef idx="0">
-            <a:schemeClr val="accent1"/>
-          </a:effectRef>
-          <a:fontRef idx="minor">
-            <a:schemeClr val="tx1"/>
-          </a:fontRef>
-        </p:style>
-      </p:cxnSp>
-      <p:sp>
-        <p:nvSpPr>
-          <p:cNvPr id="61" name="Rectangle 60"/>
+          <p:cNvPr id="120" name="Rectangle 119"/>
           <p:cNvSpPr/>
           <p:nvPr/>
         </p:nvSpPr>
         <p:spPr>
           <a:xfrm>
-            <a:off x="533399" y="5257800"/>
+            <a:off x="4953000" y="5257800"/>
             <a:ext cx="3397431" cy="609600"/>
           </a:xfrm>
           <a:prstGeom prst="rect">
@@ -14997,49 +15224,9 @@
           </a:p>
         </p:txBody>
       </p:sp>
-      <p:sp>
-        <p:nvSpPr>
-          <p:cNvPr id="62" name="Rectangle 61"/>
-          <p:cNvSpPr/>
-          <p:nvPr/>
-        </p:nvSpPr>
-        <p:spPr>
-          <a:xfrm>
-            <a:off x="533400" y="5257800"/>
-            <a:ext cx="3397431" cy="609600"/>
-          </a:xfrm>
-          <a:prstGeom prst="rect">
-            <a:avLst/>
-          </a:prstGeom>
-        </p:spPr>
-        <p:style>
-          <a:lnRef idx="2">
-            <a:schemeClr val="accent1">
-              <a:shade val="50000"/>
-            </a:schemeClr>
-          </a:lnRef>
-          <a:fillRef idx="1">
-            <a:schemeClr val="accent1"/>
-          </a:fillRef>
-          <a:effectRef idx="0">
-            <a:schemeClr val="accent1"/>
-          </a:effectRef>
-          <a:fontRef idx="minor">
-            <a:schemeClr val="lt1"/>
-          </a:fontRef>
-        </p:style>
-        <p:txBody>
-          <a:bodyPr rtlCol="0" anchor="ctr"/>
-          <a:lstStyle/>
-          <a:p>
-            <a:pPr algn="ctr"/>
-            <a:endParaRPr lang="en-US"/>
-          </a:p>
-        </p:txBody>
-      </p:sp>
       <p:pic>
         <p:nvPicPr>
-          <p:cNvPr id="63" name="Picture 62" descr="chat-4-24.png"/>
+          <p:cNvPr id="121" name="Picture 120" descr="chat-4-24.png"/>
           <p:cNvPicPr>
             <a:picLocks noChangeAspect="1"/>
           </p:cNvPicPr>
@@ -15059,7 +15246,7 @@
         </p:blipFill>
         <p:spPr>
           <a:xfrm>
-            <a:off x="1219200" y="5410200"/>
+            <a:off x="5638800" y="5410200"/>
             <a:ext cx="304800" cy="304800"/>
           </a:xfrm>
           <a:prstGeom prst="rect">
@@ -15069,7 +15256,7 @@
       </p:pic>
       <p:pic>
         <p:nvPicPr>
-          <p:cNvPr id="64" name="Picture 63" descr="student-24.png"/>
+          <p:cNvPr id="122" name="Picture 121" descr="student-24.png"/>
           <p:cNvPicPr>
             <a:picLocks noChangeAspect="1"/>
           </p:cNvPicPr>
@@ -15089,7 +15276,7 @@
         </p:blipFill>
         <p:spPr>
           <a:xfrm>
-            <a:off x="3429000" y="5410200"/>
+            <a:off x="7848600" y="5410200"/>
             <a:ext cx="304800" cy="304800"/>
           </a:xfrm>
           <a:prstGeom prst="rect">
@@ -15099,13 +15286,13 @@
       </p:pic>
       <p:sp>
         <p:nvSpPr>
-          <p:cNvPr id="65" name="Rounded Rectangle 64"/>
+          <p:cNvPr id="123" name="Rounded Rectangle 122"/>
           <p:cNvSpPr/>
           <p:nvPr/>
         </p:nvSpPr>
         <p:spPr>
           <a:xfrm>
-            <a:off x="1830977" y="5286103"/>
+            <a:off x="6250577" y="5286103"/>
             <a:ext cx="685800" cy="533400"/>
           </a:xfrm>
           <a:prstGeom prst="roundRect">
@@ -15146,7 +15333,7 @@
       </p:sp>
       <p:pic>
         <p:nvPicPr>
-          <p:cNvPr id="66" name="Picture 65" descr="gear-2-24.png"/>
+          <p:cNvPr id="124" name="Picture 123" descr="gear-2-24.png"/>
           <p:cNvPicPr>
             <a:picLocks noChangeAspect="1"/>
           </p:cNvPicPr>
@@ -15166,7 +15353,7 @@
         </p:blipFill>
         <p:spPr>
           <a:xfrm>
-            <a:off x="609600" y="5410200"/>
+            <a:off x="5029200" y="5410200"/>
             <a:ext cx="304800" cy="304800"/>
           </a:xfrm>
           <a:prstGeom prst="rect">
@@ -15176,7 +15363,7 @@
       </p:pic>
       <p:pic>
         <p:nvPicPr>
-          <p:cNvPr id="67" name="Picture 66" descr="search-13-24.png"/>
+          <p:cNvPr id="125" name="Picture 124" descr="search-13-24.png"/>
           <p:cNvPicPr>
             <a:picLocks noChangeAspect="1"/>
           </p:cNvPicPr>
@@ -15196,253 +15383,6 @@
         </p:blipFill>
         <p:spPr>
           <a:xfrm>
-            <a:off x="2819400" y="5410200"/>
-            <a:ext cx="304800" cy="304800"/>
-          </a:xfrm>
-          <a:prstGeom prst="rect">
-            <a:avLst/>
-          </a:prstGeom>
-        </p:spPr>
-      </p:pic>
-      <p:sp>
-        <p:nvSpPr>
-          <p:cNvPr id="68" name="Rectangle 67"/>
-          <p:cNvSpPr/>
-          <p:nvPr/>
-        </p:nvSpPr>
-        <p:spPr>
-          <a:xfrm>
-            <a:off x="4952999" y="5257800"/>
-            <a:ext cx="3397431" cy="609600"/>
-          </a:xfrm>
-          <a:prstGeom prst="rect">
-            <a:avLst/>
-          </a:prstGeom>
-        </p:spPr>
-        <p:style>
-          <a:lnRef idx="2">
-            <a:schemeClr val="accent1">
-              <a:shade val="50000"/>
-            </a:schemeClr>
-          </a:lnRef>
-          <a:fillRef idx="1">
-            <a:schemeClr val="accent1"/>
-          </a:fillRef>
-          <a:effectRef idx="0">
-            <a:schemeClr val="accent1"/>
-          </a:effectRef>
-          <a:fontRef idx="minor">
-            <a:schemeClr val="lt1"/>
-          </a:fontRef>
-        </p:style>
-        <p:txBody>
-          <a:bodyPr rtlCol="0" anchor="ctr"/>
-          <a:lstStyle/>
-          <a:p>
-            <a:pPr algn="ctr"/>
-            <a:endParaRPr lang="en-US"/>
-          </a:p>
-        </p:txBody>
-      </p:sp>
-      <p:sp>
-        <p:nvSpPr>
-          <p:cNvPr id="69" name="Rectangle 68"/>
-          <p:cNvSpPr/>
-          <p:nvPr/>
-        </p:nvSpPr>
-        <p:spPr>
-          <a:xfrm>
-            <a:off x="4953000" y="5257800"/>
-            <a:ext cx="3397431" cy="609600"/>
-          </a:xfrm>
-          <a:prstGeom prst="rect">
-            <a:avLst/>
-          </a:prstGeom>
-        </p:spPr>
-        <p:style>
-          <a:lnRef idx="2">
-            <a:schemeClr val="accent1">
-              <a:shade val="50000"/>
-            </a:schemeClr>
-          </a:lnRef>
-          <a:fillRef idx="1">
-            <a:schemeClr val="accent1"/>
-          </a:fillRef>
-          <a:effectRef idx="0">
-            <a:schemeClr val="accent1"/>
-          </a:effectRef>
-          <a:fontRef idx="minor">
-            <a:schemeClr val="lt1"/>
-          </a:fontRef>
-        </p:style>
-        <p:txBody>
-          <a:bodyPr rtlCol="0" anchor="ctr"/>
-          <a:lstStyle/>
-          <a:p>
-            <a:pPr algn="ctr"/>
-            <a:endParaRPr lang="en-US"/>
-          </a:p>
-        </p:txBody>
-      </p:sp>
-      <p:pic>
-        <p:nvPicPr>
-          <p:cNvPr id="70" name="Picture 69" descr="chat-4-24.png"/>
-          <p:cNvPicPr>
-            <a:picLocks noChangeAspect="1"/>
-          </p:cNvPicPr>
-          <p:nvPr/>
-        </p:nvPicPr>
-        <p:blipFill>
-          <a:blip r:embed="rId2">
-            <a:extLst>
-              <a:ext uri="{28A0092B-C50C-407E-A947-70E740481C1C}">
-                <a14:useLocalDpi xmlns:a14="http://schemas.microsoft.com/office/drawing/2010/main" val="0"/>
-              </a:ext>
-            </a:extLst>
-          </a:blip>
-          <a:stretch>
-            <a:fillRect/>
-          </a:stretch>
-        </p:blipFill>
-        <p:spPr>
-          <a:xfrm>
-            <a:off x="5638800" y="5410200"/>
-            <a:ext cx="304800" cy="304800"/>
-          </a:xfrm>
-          <a:prstGeom prst="rect">
-            <a:avLst/>
-          </a:prstGeom>
-        </p:spPr>
-      </p:pic>
-      <p:pic>
-        <p:nvPicPr>
-          <p:cNvPr id="71" name="Picture 70" descr="student-24.png"/>
-          <p:cNvPicPr>
-            <a:picLocks noChangeAspect="1"/>
-          </p:cNvPicPr>
-          <p:nvPr/>
-        </p:nvPicPr>
-        <p:blipFill>
-          <a:blip r:embed="rId3">
-            <a:extLst>
-              <a:ext uri="{28A0092B-C50C-407E-A947-70E740481C1C}">
-                <a14:useLocalDpi xmlns:a14="http://schemas.microsoft.com/office/drawing/2010/main" val="0"/>
-              </a:ext>
-            </a:extLst>
-          </a:blip>
-          <a:stretch>
-            <a:fillRect/>
-          </a:stretch>
-        </p:blipFill>
-        <p:spPr>
-          <a:xfrm>
-            <a:off x="7848600" y="5410200"/>
-            <a:ext cx="304800" cy="304800"/>
-          </a:xfrm>
-          <a:prstGeom prst="rect">
-            <a:avLst/>
-          </a:prstGeom>
-        </p:spPr>
-      </p:pic>
-      <p:sp>
-        <p:nvSpPr>
-          <p:cNvPr id="72" name="Rounded Rectangle 71"/>
-          <p:cNvSpPr/>
-          <p:nvPr/>
-        </p:nvSpPr>
-        <p:spPr>
-          <a:xfrm>
-            <a:off x="6250577" y="5286103"/>
-            <a:ext cx="685800" cy="533400"/>
-          </a:xfrm>
-          <a:prstGeom prst="roundRect">
-            <a:avLst/>
-          </a:prstGeom>
-          <a:noFill/>
-          <a:ln w="76200" cmpd="sng">
-            <a:solidFill>
-              <a:schemeClr val="accent1">
-                <a:lumMod val="75000"/>
-              </a:schemeClr>
-            </a:solidFill>
-          </a:ln>
-          <a:effectLst/>
-        </p:spPr>
-        <p:style>
-          <a:lnRef idx="1">
-            <a:schemeClr val="accent1"/>
-          </a:lnRef>
-          <a:fillRef idx="3">
-            <a:schemeClr val="accent1"/>
-          </a:fillRef>
-          <a:effectRef idx="2">
-            <a:schemeClr val="accent1"/>
-          </a:effectRef>
-          <a:fontRef idx="minor">
-            <a:schemeClr val="lt1"/>
-          </a:fontRef>
-        </p:style>
-        <p:txBody>
-          <a:bodyPr rtlCol="0" anchor="ctr"/>
-          <a:lstStyle/>
-          <a:p>
-            <a:pPr algn="ctr"/>
-            <a:endParaRPr lang="en-US"/>
-          </a:p>
-        </p:txBody>
-      </p:sp>
-      <p:pic>
-        <p:nvPicPr>
-          <p:cNvPr id="73" name="Picture 72" descr="gear-2-24.png"/>
-          <p:cNvPicPr>
-            <a:picLocks noChangeAspect="1"/>
-          </p:cNvPicPr>
-          <p:nvPr/>
-        </p:nvPicPr>
-        <p:blipFill>
-          <a:blip r:embed="rId4">
-            <a:extLst>
-              <a:ext uri="{28A0092B-C50C-407E-A947-70E740481C1C}">
-                <a14:useLocalDpi xmlns:a14="http://schemas.microsoft.com/office/drawing/2010/main" val="0"/>
-              </a:ext>
-            </a:extLst>
-          </a:blip>
-          <a:stretch>
-            <a:fillRect/>
-          </a:stretch>
-        </p:blipFill>
-        <p:spPr>
-          <a:xfrm>
-            <a:off x="5029200" y="5410200"/>
-            <a:ext cx="304800" cy="304800"/>
-          </a:xfrm>
-          <a:prstGeom prst="rect">
-            <a:avLst/>
-          </a:prstGeom>
-        </p:spPr>
-      </p:pic>
-      <p:pic>
-        <p:nvPicPr>
-          <p:cNvPr id="74" name="Picture 73" descr="search-13-24.png"/>
-          <p:cNvPicPr>
-            <a:picLocks noChangeAspect="1"/>
-          </p:cNvPicPr>
-          <p:nvPr/>
-        </p:nvPicPr>
-        <p:blipFill>
-          <a:blip r:embed="rId5">
-            <a:extLst>
-              <a:ext uri="{28A0092B-C50C-407E-A947-70E740481C1C}">
-                <a14:useLocalDpi xmlns:a14="http://schemas.microsoft.com/office/drawing/2010/main" val="0"/>
-              </a:ext>
-            </a:extLst>
-          </a:blip>
-          <a:stretch>
-            <a:fillRect/>
-          </a:stretch>
-        </p:blipFill>
-        <p:spPr>
-          <a:xfrm>
             <a:off x="7239000" y="5410200"/>
             <a:ext cx="304800" cy="304800"/>
           </a:xfrm>
@@ -15451,42 +15391,98 @@
           </a:prstGeom>
         </p:spPr>
       </p:pic>
-      <p:cxnSp>
-        <p:nvCxnSpPr>
-          <p:cNvPr id="47" name="Straight Arrow Connector 46"/>
-          <p:cNvCxnSpPr/>
-          <p:nvPr/>
-        </p:nvCxnSpPr>
-        <p:spPr>
-          <a:xfrm>
-            <a:off x="152400" y="3048000"/>
-            <a:ext cx="304800" cy="0"/>
-          </a:xfrm>
-          <a:prstGeom prst="straightConnector1">
-            <a:avLst/>
-          </a:prstGeom>
-          <a:ln w="28575">
-            <a:solidFill>
-              <a:srgbClr val="FF0000"/>
-            </a:solidFill>
-            <a:tailEnd type="arrow"/>
-          </a:ln>
-        </p:spPr>
-        <p:style>
-          <a:lnRef idx="1">
-            <a:schemeClr val="accent1"/>
-          </a:lnRef>
-          <a:fillRef idx="0">
-            <a:schemeClr val="accent1"/>
-          </a:fillRef>
-          <a:effectRef idx="0">
-            <a:schemeClr val="accent1"/>
-          </a:effectRef>
-          <a:fontRef idx="minor">
-            <a:schemeClr val="tx1"/>
-          </a:fontRef>
-        </p:style>
-      </p:cxnSp>
+      <p:sp>
+        <p:nvSpPr>
+          <p:cNvPr id="126" name="TextBox 125"/>
+          <p:cNvSpPr txBox="1"/>
+          <p:nvPr/>
+        </p:nvSpPr>
+        <p:spPr>
+          <a:xfrm>
+            <a:off x="5562600" y="2133600"/>
+            <a:ext cx="1905000" cy="369332"/>
+          </a:xfrm>
+          <a:prstGeom prst="rect">
+            <a:avLst/>
+          </a:prstGeom>
+          <a:noFill/>
+        </p:spPr>
+        <p:txBody>
+          <a:bodyPr wrap="square" rtlCol="0">
+            <a:spAutoFit/>
+          </a:bodyPr>
+          <a:lstStyle/>
+          <a:p>
+            <a:r>
+              <a:rPr lang="en-US" dirty="0" smtClean="0">
+                <a:solidFill>
+                  <a:schemeClr val="tx2">
+                    <a:lumMod val="75000"/>
+                  </a:schemeClr>
+                </a:solidFill>
+                <a:latin typeface="Bradley Hand Bold"/>
+                <a:cs typeface="Bradley Hand Bold"/>
+              </a:rPr>
+              <a:t>Blocked List</a:t>
+            </a:r>
+            <a:endParaRPr lang="en-US" dirty="0">
+              <a:solidFill>
+                <a:schemeClr val="tx2">
+                  <a:lumMod val="75000"/>
+                </a:schemeClr>
+              </a:solidFill>
+              <a:latin typeface="Bradley Hand Bold"/>
+              <a:cs typeface="Bradley Hand Bold"/>
+            </a:endParaRPr>
+          </a:p>
+        </p:txBody>
+      </p:sp>
+      <p:sp>
+        <p:nvSpPr>
+          <p:cNvPr id="127" name="TextBox 126"/>
+          <p:cNvSpPr txBox="1"/>
+          <p:nvPr/>
+        </p:nvSpPr>
+        <p:spPr>
+          <a:xfrm>
+            <a:off x="5562600" y="3657600"/>
+            <a:ext cx="2667000" cy="369332"/>
+          </a:xfrm>
+          <a:prstGeom prst="rect">
+            <a:avLst/>
+          </a:prstGeom>
+          <a:noFill/>
+        </p:spPr>
+        <p:txBody>
+          <a:bodyPr wrap="square" rtlCol="0">
+            <a:spAutoFit/>
+          </a:bodyPr>
+          <a:lstStyle/>
+          <a:p>
+            <a:r>
+              <a:rPr lang="en-US" dirty="0" smtClean="0">
+                <a:solidFill>
+                  <a:schemeClr val="tx2">
+                    <a:lumMod val="75000"/>
+                  </a:schemeClr>
+                </a:solidFill>
+                <a:latin typeface="Bradley Hand Bold"/>
+                <a:cs typeface="Bradley Hand Bold"/>
+              </a:rPr>
+              <a:t>Add user to Blocked List</a:t>
+            </a:r>
+            <a:endParaRPr lang="en-US" dirty="0">
+              <a:solidFill>
+                <a:schemeClr val="tx2">
+                  <a:lumMod val="75000"/>
+                </a:schemeClr>
+              </a:solidFill>
+              <a:latin typeface="Bradley Hand Bold"/>
+              <a:cs typeface="Bradley Hand Bold"/>
+            </a:endParaRPr>
+          </a:p>
+        </p:txBody>
+      </p:sp>
     </p:spTree>
     <p:extLst>
       <p:ext uri="{BB962C8B-B14F-4D97-AF65-F5344CB8AC3E}">
@@ -23986,23 +23982,7 @@
                   <a:srgbClr val="FFFFFF"/>
                 </a:solidFill>
               </a:rPr>
-              <a:t>Your account has not been verified. Please </a:t>
-            </a:r>
-            <a:r>
-              <a:rPr lang="en-US" dirty="0" smtClean="0">
-                <a:solidFill>
-                  <a:srgbClr val="FFFFFF"/>
-                </a:solidFill>
-              </a:rPr>
-              <a:t>check </a:t>
-            </a:r>
-            <a:r>
-              <a:rPr lang="en-US" dirty="0" smtClean="0">
-                <a:solidFill>
-                  <a:srgbClr val="FFFFFF"/>
-                </a:solidFill>
-              </a:rPr>
-              <a:t>email for verification link </a:t>
+              <a:t>Your account has not been verified. Please check email for verification link </a:t>
             </a:r>
             <a:r>
               <a:rPr lang="en-US" dirty="0" smtClean="0">
@@ -25166,7 +25146,6 @@
               <a:rPr lang="en-US" sz="2200" dirty="0" smtClean="0"/>
               <a:t>Darcie Odom</a:t>
             </a:r>
-            <a:endParaRPr lang="en-US" sz="2200" dirty="0" smtClean="0"/>
           </a:p>
           <a:p>
             <a:r>
@@ -25990,31 +25969,7 @@
                   <a:srgbClr val="FF0000"/>
                 </a:solidFill>
               </a:rPr>
-              <a:t>Login with invalid </a:t>
-            </a:r>
-            <a:r>
-              <a:rPr lang="en-US" b="1" dirty="0" smtClean="0">
-                <a:solidFill>
-                  <a:srgbClr val="FF0000"/>
-                </a:solidFill>
-              </a:rPr>
-              <a:t>username</a:t>
-            </a:r>
-            <a:r>
-              <a:rPr lang="en-US" b="1" dirty="0" smtClean="0">
-                <a:solidFill>
-                  <a:srgbClr val="FF0000"/>
-                </a:solidFill>
-              </a:rPr>
-              <a:t>/</a:t>
-            </a:r>
-            <a:r>
-              <a:rPr lang="en-US" b="1" dirty="0" smtClean="0">
-                <a:solidFill>
-                  <a:srgbClr val="FF0000"/>
-                </a:solidFill>
-              </a:rPr>
-              <a:t>password</a:t>
+              <a:t>Login with invalid username/password</a:t>
             </a:r>
             <a:endParaRPr lang="en-US" b="1" dirty="0">
               <a:solidFill>
@@ -26670,15 +26625,7 @@
                   <a:srgbClr val="FFFFFF"/>
                 </a:solidFill>
               </a:rPr>
-              <a:t>Username </a:t>
-            </a:r>
-            <a:r>
-              <a:rPr lang="en-US" dirty="0" smtClean="0">
-                <a:solidFill>
-                  <a:srgbClr val="FFFFFF"/>
-                </a:solidFill>
-              </a:rPr>
-              <a:t>and password do not match. Please try again</a:t>
+              <a:t>Username and password do not match. Please try again</a:t>
             </a:r>
             <a:endParaRPr lang="en-US" dirty="0">
               <a:solidFill>
@@ -29344,31 +29291,7 @@
                   <a:srgbClr val="FF0000"/>
                 </a:solidFill>
               </a:rPr>
-              <a:t>valid </a:t>
-            </a:r>
-            <a:r>
-              <a:rPr lang="en-US" b="1" dirty="0" smtClean="0">
-                <a:solidFill>
-                  <a:srgbClr val="FF0000"/>
-                </a:solidFill>
-              </a:rPr>
-              <a:t>username</a:t>
-            </a:r>
-            <a:r>
-              <a:rPr lang="en-US" b="1" dirty="0" smtClean="0">
-                <a:solidFill>
-                  <a:srgbClr val="FF0000"/>
-                </a:solidFill>
-              </a:rPr>
-              <a:t>/</a:t>
-            </a:r>
-            <a:r>
-              <a:rPr lang="en-US" b="1" dirty="0" smtClean="0">
-                <a:solidFill>
-                  <a:srgbClr val="FF0000"/>
-                </a:solidFill>
-              </a:rPr>
-              <a:t>password</a:t>
+              <a:t>valid username/password</a:t>
             </a:r>
             <a:endParaRPr lang="en-US" b="1" dirty="0">
               <a:solidFill>

</xml_diff>